<commit_message>
test inegration version final
</commit_message>
<xml_diff>
--- a/Presentation.pptx
+++ b/Presentation.pptx
@@ -5,7 +5,7 @@
     <p:sldMasterId id="2147483672" r:id="rId1"/>
   </p:sldMasterIdLst>
   <p:notesMasterIdLst>
-    <p:notesMasterId r:id="rId18"/>
+    <p:notesMasterId r:id="rId17"/>
   </p:notesMasterIdLst>
   <p:sldIdLst>
     <p:sldId id="256" r:id="rId2"/>
@@ -14,16 +14,15 @@
     <p:sldId id="275" r:id="rId5"/>
     <p:sldId id="260" r:id="rId6"/>
     <p:sldId id="283" r:id="rId7"/>
-    <p:sldId id="284" r:id="rId8"/>
-    <p:sldId id="285" r:id="rId9"/>
-    <p:sldId id="286" r:id="rId10"/>
-    <p:sldId id="287" r:id="rId11"/>
-    <p:sldId id="288" r:id="rId12"/>
-    <p:sldId id="289" r:id="rId13"/>
-    <p:sldId id="290" r:id="rId14"/>
-    <p:sldId id="291" r:id="rId15"/>
-    <p:sldId id="292" r:id="rId16"/>
-    <p:sldId id="293" r:id="rId17"/>
+    <p:sldId id="285" r:id="rId8"/>
+    <p:sldId id="286" r:id="rId9"/>
+    <p:sldId id="287" r:id="rId10"/>
+    <p:sldId id="288" r:id="rId11"/>
+    <p:sldId id="289" r:id="rId12"/>
+    <p:sldId id="290" r:id="rId13"/>
+    <p:sldId id="291" r:id="rId14"/>
+    <p:sldId id="292" r:id="rId15"/>
+    <p:sldId id="293" r:id="rId16"/>
   </p:sldIdLst>
   <p:sldSz cx="12192000" cy="6858000"/>
   <p:notesSz cx="6858000" cy="9144000"/>
@@ -4197,7 +4196,7 @@
   <dgm:whole/>
   <dgm:extLst>
     <a:ext uri="http://schemas.microsoft.com/office/drawing/2008/diagram">
-      <dsp:dataModelExt xmlns:dsp="http://schemas.microsoft.com/office/drawing/2008/diagram" relId="rId6" minVer="http://schemas.openxmlformats.org/drawingml/2006/diagram"/>
+      <dsp:dataModelExt xmlns:dsp="http://schemas.microsoft.com/office/drawing/2008/diagram" relId="rId7" minVer="http://schemas.openxmlformats.org/drawingml/2006/diagram"/>
     </a:ext>
   </dgm:extLst>
 </dgm:dataModel>
@@ -4490,7 +4489,7 @@
   <dgm:whole/>
   <dgm:extLst>
     <a:ext uri="http://schemas.microsoft.com/office/drawing/2008/diagram">
-      <dsp:dataModelExt xmlns:dsp="http://schemas.microsoft.com/office/drawing/2008/diagram" relId="rId6" minVer="http://schemas.openxmlformats.org/drawingml/2006/diagram"/>
+      <dsp:dataModelExt xmlns:dsp="http://schemas.microsoft.com/office/drawing/2008/diagram" relId="rId7" minVer="http://schemas.openxmlformats.org/drawingml/2006/diagram"/>
     </a:ext>
   </dgm:extLst>
 </dgm:dataModel>
@@ -7733,7 +7732,7 @@
           <a:p>
             <a:fld id="{D4229F12-F7B2-4FC0-BE60-4BED588071B2}" type="datetimeFigureOut">
               <a:rPr lang="fr-FR" smtClean="0"/>
-              <a:t>03/06/2025</a:t>
+              <a:t>05/06/2025</a:t>
             </a:fld>
             <a:endParaRPr lang="fr-FR"/>
           </a:p>
@@ -8044,174 +8043,96 @@
           <a:bodyPr/>
           <a:lstStyle/>
           <a:p>
-            <a:pPr marL="342900" lvl="0" indent="-342900">
+            <a:pPr marL="0" marR="0" lvl="0" indent="0" algn="l" defTabSz="914400" rtl="0" eaLnBrk="1" fontAlgn="auto" latinLnBrk="0" hangingPunct="1">
               <a:lnSpc>
-                <a:spcPct val="115000"/>
+                <a:spcPct val="100000"/>
               </a:lnSpc>
-              <a:buFont typeface="Aptos" panose="020B0004020202020204" pitchFamily="34" charset="0"/>
-              <a:buChar char="-"/>
+              <a:spcBef>
+                <a:spcPts val="0"/>
+              </a:spcBef>
+              <a:spcAft>
+                <a:spcPts val="0"/>
+              </a:spcAft>
+              <a:buClrTx/>
+              <a:buSzTx/>
+              <a:buFontTx/>
+              <a:buNone/>
+              <a:tabLst/>
+              <a:defRPr/>
             </a:pPr>
             <a:r>
-              <a:rPr lang="fr-FR" sz="1800" kern="100" dirty="0">
+              <a:rPr lang="fr-FR" dirty="0"/>
+              <a:t>Bonjour, je m’appelle Idriss Askri, tout juste employer a la société </a:t>
+            </a:r>
+            <a:r>
+              <a:rPr lang="fr-FR" dirty="0" err="1"/>
+              <a:t>Lambazon</a:t>
+            </a:r>
+            <a:r>
+              <a:rPr lang="fr-FR" dirty="0"/>
+              <a:t> Aujourd’hui, je vous présente mon travail sur l’</a:t>
+            </a:r>
+            <a:r>
+              <a:rPr lang="fr-FR" sz="1200" b="0" i="0" kern="1200" dirty="0">
+                <a:solidFill>
+                  <a:schemeClr val="tx1"/>
+                </a:solidFill>
                 <a:effectLst/>
-                <a:latin typeface="Aptos" panose="020B0004020202020204" pitchFamily="34" charset="0"/>
-                <a:ea typeface="Aptos" panose="020B0004020202020204" pitchFamily="34" charset="0"/>
-                <a:cs typeface="Times New Roman" panose="02020603050405020304" pitchFamily="18" charset="0"/>
-              </a:rPr>
-              <a:t>Contexte (Tout juste embauché, il s’agit de ma </a:t>
-            </a:r>
-            <a:r>
-              <a:rPr lang="fr-FR" sz="1800" kern="100" dirty="0" err="1">
-                <a:effectLst/>
-                <a:latin typeface="Aptos" panose="020B0004020202020204" pitchFamily="34" charset="0"/>
-                <a:ea typeface="Aptos" panose="020B0004020202020204" pitchFamily="34" charset="0"/>
-                <a:cs typeface="Times New Roman" panose="02020603050405020304" pitchFamily="18" charset="0"/>
-              </a:rPr>
-              <a:t>premiere</a:t>
-            </a:r>
-            <a:r>
-              <a:rPr lang="fr-FR" sz="1800" kern="100" dirty="0">
-                <a:effectLst/>
-                <a:latin typeface="Aptos" panose="020B0004020202020204" pitchFamily="34" charset="0"/>
-                <a:ea typeface="Aptos" panose="020B0004020202020204" pitchFamily="34" charset="0"/>
-                <a:cs typeface="Times New Roman" panose="02020603050405020304" pitchFamily="18" charset="0"/>
-              </a:rPr>
-              <a:t> principal mission dans l’entreprise )</a:t>
-            </a:r>
-          </a:p>
-          <a:p>
-            <a:pPr marL="342900" lvl="0" indent="-342900">
-              <a:lnSpc>
-                <a:spcPct val="115000"/>
-              </a:lnSpc>
-              <a:buFont typeface="Aptos" panose="020B0004020202020204" pitchFamily="34" charset="0"/>
-              <a:buChar char="-"/>
-            </a:pPr>
-            <a:r>
-              <a:rPr lang="fr-FR" sz="1800" kern="100" dirty="0">
-                <a:effectLst/>
-                <a:latin typeface="Aptos" panose="020B0004020202020204" pitchFamily="34" charset="0"/>
-                <a:ea typeface="Aptos" panose="020B0004020202020204" pitchFamily="34" charset="0"/>
-                <a:cs typeface="Times New Roman" panose="02020603050405020304" pitchFamily="18" charset="0"/>
+                <a:latin typeface="+mn-lt"/>
+                <a:ea typeface="+mn-ea"/>
+                <a:cs typeface="+mn-cs"/>
               </a:rPr>
               <a:t>Application Web </a:t>
             </a:r>
             <a:r>
-              <a:rPr lang="fr-FR" sz="1800" kern="100" dirty="0" err="1">
+              <a:rPr lang="fr-FR" sz="1200" b="0" i="0" kern="1200" dirty="0" err="1">
+                <a:solidFill>
+                  <a:schemeClr val="tx1"/>
+                </a:solidFill>
                 <a:effectLst/>
-                <a:latin typeface="Aptos" panose="020B0004020202020204" pitchFamily="34" charset="0"/>
-                <a:ea typeface="Aptos" panose="020B0004020202020204" pitchFamily="34" charset="0"/>
-                <a:cs typeface="Times New Roman" panose="02020603050405020304" pitchFamily="18" charset="0"/>
+                <a:latin typeface="+mn-lt"/>
+                <a:ea typeface="+mn-ea"/>
+                <a:cs typeface="+mn-cs"/>
               </a:rPr>
               <a:t>Lambazon</a:t>
             </a:r>
-            <a:endParaRPr lang="fr-FR" sz="1800" kern="100" dirty="0">
-              <a:effectLst/>
-              <a:latin typeface="Aptos" panose="020B0004020202020204" pitchFamily="34" charset="0"/>
-              <a:ea typeface="Aptos" panose="020B0004020202020204" pitchFamily="34" charset="0"/>
-              <a:cs typeface="Times New Roman" panose="02020603050405020304" pitchFamily="18" charset="0"/>
-            </a:endParaRPr>
-          </a:p>
-          <a:p>
-            <a:pPr marL="342900" lvl="0" indent="-342900">
-              <a:lnSpc>
-                <a:spcPct val="115000"/>
-              </a:lnSpc>
-              <a:buFont typeface="Aptos" panose="020B0004020202020204" pitchFamily="34" charset="0"/>
-              <a:buChar char="-"/>
-            </a:pPr>
-            <a:r>
-              <a:rPr lang="fr-FR" sz="1800" kern="100" dirty="0" err="1">
+            <a:r>
+              <a:rPr lang="fr-FR" sz="1200" b="0" i="0" kern="1200" dirty="0">
+                <a:solidFill>
+                  <a:schemeClr val="tx1"/>
+                </a:solidFill>
                 <a:effectLst/>
-                <a:latin typeface="Aptos" panose="020B0004020202020204" pitchFamily="34" charset="0"/>
-                <a:ea typeface="Aptos" panose="020B0004020202020204" pitchFamily="34" charset="0"/>
-                <a:cs typeface="Times New Roman" panose="02020603050405020304" pitchFamily="18" charset="0"/>
+                <a:latin typeface="+mn-lt"/>
+                <a:ea typeface="+mn-ea"/>
+                <a:cs typeface="+mn-cs"/>
               </a:rPr>
-              <a:t>Presentation</a:t>
-            </a:r>
-            <a:r>
-              <a:rPr lang="fr-FR" sz="1800" kern="100" dirty="0">
-                <a:effectLst/>
-                <a:latin typeface="Aptos" panose="020B0004020202020204" pitchFamily="34" charset="0"/>
-                <a:ea typeface="Aptos" panose="020B0004020202020204" pitchFamily="34" charset="0"/>
-                <a:cs typeface="Times New Roman" panose="02020603050405020304" pitchFamily="18" charset="0"/>
-              </a:rPr>
-              <a:t> des mission me concernant </a:t>
-            </a:r>
-          </a:p>
-          <a:p>
-            <a:pPr marL="342900" lvl="0" indent="-342900">
-              <a:lnSpc>
-                <a:spcPct val="115000"/>
-              </a:lnSpc>
-              <a:buFont typeface="Aptos" panose="020B0004020202020204" pitchFamily="34" charset="0"/>
-              <a:buChar char="-"/>
-            </a:pPr>
-            <a:r>
-              <a:rPr lang="fr-FR" sz="1800" kern="100" dirty="0">
-                <a:effectLst/>
-                <a:latin typeface="Aptos" panose="020B0004020202020204" pitchFamily="34" charset="0"/>
-                <a:ea typeface="Aptos" panose="020B0004020202020204" pitchFamily="34" charset="0"/>
-                <a:cs typeface="Times New Roman" panose="02020603050405020304" pitchFamily="18" charset="0"/>
-              </a:rPr>
-              <a:t>Réaliser des tests manuels sur l’interface,</a:t>
-            </a:r>
-          </a:p>
-          <a:p>
-            <a:pPr marL="342900" lvl="0" indent="-342900">
-              <a:lnSpc>
-                <a:spcPct val="115000"/>
-              </a:lnSpc>
-              <a:buFont typeface="Aptos" panose="020B0004020202020204" pitchFamily="34" charset="0"/>
-              <a:buChar char="-"/>
-            </a:pPr>
-            <a:r>
-              <a:rPr lang="fr-FR" sz="1800" kern="100" dirty="0">
-                <a:effectLst/>
-                <a:latin typeface="Aptos" panose="020B0004020202020204" pitchFamily="34" charset="0"/>
-                <a:ea typeface="Aptos" panose="020B0004020202020204" pitchFamily="34" charset="0"/>
-                <a:cs typeface="Times New Roman" panose="02020603050405020304" pitchFamily="18" charset="0"/>
-              </a:rPr>
-              <a:t>Corriger les éventuels bugs rencontrer durant ces tests,</a:t>
-            </a:r>
-          </a:p>
-          <a:p>
-            <a:pPr marL="342900" lvl="0" indent="-342900">
-              <a:lnSpc>
-                <a:spcPct val="115000"/>
-              </a:lnSpc>
-              <a:buFont typeface="Aptos" panose="020B0004020202020204" pitchFamily="34" charset="0"/>
-              <a:buChar char="-"/>
-            </a:pPr>
-            <a:r>
-              <a:rPr lang="fr-FR" sz="1800" kern="100" dirty="0">
-                <a:effectLst/>
-                <a:latin typeface="Aptos" panose="020B0004020202020204" pitchFamily="34" charset="0"/>
-                <a:ea typeface="Aptos" panose="020B0004020202020204" pitchFamily="34" charset="0"/>
-                <a:cs typeface="Times New Roman" panose="02020603050405020304" pitchFamily="18" charset="0"/>
-              </a:rPr>
-              <a:t>Effectuer les tâches en attente (notées en TODO dans le code),</a:t>
-            </a:r>
-          </a:p>
-          <a:p>
-            <a:pPr marL="342900" lvl="0" indent="-342900">
-              <a:lnSpc>
-                <a:spcPct val="115000"/>
-              </a:lnSpc>
-              <a:spcAft>
-                <a:spcPts val="800"/>
-              </a:spcAft>
-              <a:buFont typeface="Aptos" panose="020B0004020202020204" pitchFamily="34" charset="0"/>
-              <a:buChar char="-"/>
-            </a:pPr>
-            <a:r>
-              <a:rPr lang="fr-FR" sz="1800" kern="100" dirty="0">
-                <a:effectLst/>
-                <a:latin typeface="Aptos" panose="020B0004020202020204" pitchFamily="34" charset="0"/>
-                <a:ea typeface="Aptos" panose="020B0004020202020204" pitchFamily="34" charset="0"/>
-                <a:cs typeface="Times New Roman" panose="02020603050405020304" pitchFamily="18" charset="0"/>
-              </a:rPr>
-              <a:t>Et enfin, finaliser le code pour rendre l’application fonctionnelle et fiable.</a:t>
+              <a:t> . </a:t>
+            </a:r>
+            <a:r>
+              <a:rPr lang="fr-FR" dirty="0"/>
+              <a:t>L’objectif était  de  reprendre un module d’une application ASP.NET </a:t>
+            </a:r>
+            <a:r>
+              <a:rPr lang="fr-FR" dirty="0" err="1"/>
+              <a:t>Core</a:t>
+            </a:r>
+            <a:r>
+              <a:rPr lang="fr-FR" dirty="0"/>
+              <a:t> développé par un ancien collègue, Louis.</a:t>
+            </a:r>
+            <a:br>
+              <a:rPr lang="fr-FR" dirty="0"/>
+            </a:br>
+            <a:r>
+              <a:rPr lang="fr-FR" dirty="0"/>
+              <a:t>Mon rôle était de finaliser une fonctionnalité essentielle pour la gestion d’un inventaire interne, en particulier la validation du formulaire de création de produit, ainsi que l’implémentation de tests pour s'assurer que tout fonctionne correctement.</a:t>
+            </a:r>
+            <a:br>
+              <a:rPr lang="fr-FR" dirty="0"/>
+            </a:br>
+            <a:r>
+              <a:rPr lang="fr-FR" dirty="0"/>
+              <a:t>Je vais vous montrer comment j’ai compris le besoin, analysé le code existant, mis en œuvre les règles de validation, et écrit les tests pour vérifier tout cela.</a:t>
             </a:r>
           </a:p>
           <a:p>
@@ -8234,6 +8155,760 @@
           <a:bodyPr/>
           <a:lstStyle/>
           <a:p>
+            <a:fld id="{A07B8C24-F907-4392-B726-2485ED062295}" type="slidenum">
+              <a:rPr lang="fr-FR" smtClean="0"/>
+              <a:t>1</a:t>
+            </a:fld>
+            <a:endParaRPr lang="fr-FR"/>
+          </a:p>
+        </p:txBody>
+      </p:sp>
+    </p:spTree>
+    <p:extLst>
+      <p:ext uri="{BB962C8B-B14F-4D97-AF65-F5344CB8AC3E}">
+        <p14:creationId xmlns:p14="http://schemas.microsoft.com/office/powerpoint/2010/main" val="1882229321"/>
+      </p:ext>
+    </p:extLst>
+  </p:cSld>
+  <p:clrMapOvr>
+    <a:masterClrMapping/>
+  </p:clrMapOvr>
+</p:notes>
+</file>
+
+<file path=ppt/notesSlides/notesSlide10.xml><?xml version="1.0" encoding="utf-8"?>
+<p:notes xmlns:a="http://schemas.openxmlformats.org/drawingml/2006/main" xmlns:r="http://schemas.openxmlformats.org/officeDocument/2006/relationships" xmlns:p="http://schemas.openxmlformats.org/presentationml/2006/main">
+  <p:cSld>
+    <p:spTree>
+      <p:nvGrpSpPr>
+        <p:cNvPr id="1" name=""/>
+        <p:cNvGrpSpPr/>
+        <p:nvPr/>
+      </p:nvGrpSpPr>
+      <p:grpSpPr>
+        <a:xfrm>
+          <a:off x="0" y="0"/>
+          <a:ext cx="0" cy="0"/>
+          <a:chOff x="0" y="0"/>
+          <a:chExt cx="0" cy="0"/>
+        </a:xfrm>
+      </p:grpSpPr>
+      <p:sp>
+        <p:nvSpPr>
+          <p:cNvPr id="2" name="Espace réservé de l'image des diapositives 1"/>
+          <p:cNvSpPr>
+            <a:spLocks noGrp="1" noRot="1" noChangeAspect="1"/>
+          </p:cNvSpPr>
+          <p:nvPr>
+            <p:ph type="sldImg"/>
+          </p:nvPr>
+        </p:nvSpPr>
+        <p:spPr/>
+      </p:sp>
+      <p:sp>
+        <p:nvSpPr>
+          <p:cNvPr id="3" name="Espace réservé des notes 2"/>
+          <p:cNvSpPr>
+            <a:spLocks noGrp="1"/>
+          </p:cNvSpPr>
+          <p:nvPr>
+            <p:ph type="body" idx="1"/>
+          </p:nvPr>
+        </p:nvSpPr>
+        <p:spPr/>
+        <p:txBody>
+          <a:bodyPr/>
+          <a:lstStyle/>
+          <a:p>
+            <a:r>
+              <a:rPr lang="fr-FR" dirty="0"/>
+              <a:t>Voici un exemple de test complet. Il teste le cas où le produit n’a pas de nom.</a:t>
+            </a:r>
+          </a:p>
+          <a:p>
+            <a:r>
+              <a:rPr lang="fr-FR" b="1" dirty="0"/>
+              <a:t>Arrange</a:t>
+            </a:r>
+            <a:r>
+              <a:rPr lang="fr-FR" dirty="0"/>
+              <a:t> : je prépare un produit sans nom, avec un prix et une quantité valides.</a:t>
+            </a:r>
+          </a:p>
+          <a:p>
+            <a:r>
+              <a:rPr lang="fr-FR" b="1" dirty="0" err="1"/>
+              <a:t>Act</a:t>
+            </a:r>
+            <a:r>
+              <a:rPr lang="fr-FR" dirty="0"/>
+              <a:t> : j’appelle </a:t>
+            </a:r>
+            <a:r>
+              <a:rPr lang="fr-FR" dirty="0" err="1"/>
+              <a:t>CheckProductModelErrors</a:t>
+            </a:r>
+            <a:r>
+              <a:rPr lang="fr-FR" dirty="0"/>
+              <a:t>.</a:t>
+            </a:r>
+          </a:p>
+          <a:p>
+            <a:r>
+              <a:rPr lang="fr-FR" b="1" dirty="0" err="1"/>
+              <a:t>Assert</a:t>
+            </a:r>
+            <a:r>
+              <a:rPr lang="fr-FR" dirty="0"/>
+              <a:t> : je vérifie que la liste d’erreurs contient bien "</a:t>
+            </a:r>
+            <a:r>
+              <a:rPr lang="fr-FR" dirty="0" err="1"/>
+              <a:t>MissingName</a:t>
+            </a:r>
+            <a:r>
+              <a:rPr lang="fr-FR" dirty="0"/>
+              <a:t>".</a:t>
+            </a:r>
+            <a:br>
+              <a:rPr lang="fr-FR" dirty="0"/>
+            </a:br>
+            <a:r>
+              <a:rPr lang="fr-FR" dirty="0"/>
+              <a:t>Ce test vérifie que la validation fonctionne comme prévu pour ce cas précis.</a:t>
+            </a:r>
+            <a:br>
+              <a:rPr lang="fr-FR" dirty="0"/>
+            </a:br>
+            <a:r>
+              <a:rPr lang="fr-FR" dirty="0"/>
+              <a:t>Et j’ai fait la même chose pour les 6 autres règles.</a:t>
+            </a:r>
+          </a:p>
+        </p:txBody>
+      </p:sp>
+      <p:sp>
+        <p:nvSpPr>
+          <p:cNvPr id="4" name="Espace réservé du numéro de diapositive 3"/>
+          <p:cNvSpPr>
+            <a:spLocks noGrp="1"/>
+          </p:cNvSpPr>
+          <p:nvPr>
+            <p:ph type="sldNum" sz="quarter" idx="5"/>
+          </p:nvPr>
+        </p:nvSpPr>
+        <p:spPr/>
+        <p:txBody>
+          <a:bodyPr/>
+          <a:lstStyle/>
+          <a:p>
+            <a:fld id="{A07B8C24-F907-4392-B726-2485ED062295}" type="slidenum">
+              <a:rPr lang="fr-FR" smtClean="0"/>
+              <a:t>11</a:t>
+            </a:fld>
+            <a:endParaRPr lang="fr-FR"/>
+          </a:p>
+        </p:txBody>
+      </p:sp>
+    </p:spTree>
+    <p:extLst>
+      <p:ext uri="{BB962C8B-B14F-4D97-AF65-F5344CB8AC3E}">
+        <p14:creationId xmlns:p14="http://schemas.microsoft.com/office/powerpoint/2010/main" val="3312578868"/>
+      </p:ext>
+    </p:extLst>
+  </p:cSld>
+  <p:clrMapOvr>
+    <a:masterClrMapping/>
+  </p:clrMapOvr>
+</p:notes>
+</file>
+
+<file path=ppt/notesSlides/notesSlide11.xml><?xml version="1.0" encoding="utf-8"?>
+<p:notes xmlns:a="http://schemas.openxmlformats.org/drawingml/2006/main" xmlns:r="http://schemas.openxmlformats.org/officeDocument/2006/relationships" xmlns:p="http://schemas.openxmlformats.org/presentationml/2006/main">
+  <p:cSld>
+    <p:spTree>
+      <p:nvGrpSpPr>
+        <p:cNvPr id="1" name=""/>
+        <p:cNvGrpSpPr/>
+        <p:nvPr/>
+      </p:nvGrpSpPr>
+      <p:grpSpPr>
+        <a:xfrm>
+          <a:off x="0" y="0"/>
+          <a:ext cx="0" cy="0"/>
+          <a:chOff x="0" y="0"/>
+          <a:chExt cx="0" cy="0"/>
+        </a:xfrm>
+      </p:grpSpPr>
+      <p:sp>
+        <p:nvSpPr>
+          <p:cNvPr id="2" name="Espace réservé de l'image des diapositives 1"/>
+          <p:cNvSpPr>
+            <a:spLocks noGrp="1" noRot="1" noChangeAspect="1"/>
+          </p:cNvSpPr>
+          <p:nvPr>
+            <p:ph type="sldImg"/>
+          </p:nvPr>
+        </p:nvSpPr>
+        <p:spPr/>
+      </p:sp>
+      <p:sp>
+        <p:nvSpPr>
+          <p:cNvPr id="3" name="Espace réservé des notes 2"/>
+          <p:cNvSpPr>
+            <a:spLocks noGrp="1"/>
+          </p:cNvSpPr>
+          <p:nvPr>
+            <p:ph type="body" idx="1"/>
+          </p:nvPr>
+        </p:nvSpPr>
+        <p:spPr/>
+        <p:txBody>
+          <a:bodyPr/>
+          <a:lstStyle/>
+          <a:p>
+            <a:r>
+              <a:rPr lang="fr-FR" dirty="0"/>
+              <a:t>Tous mes tests passent dans l’explorateur de tests de Visual Studio.</a:t>
+            </a:r>
+            <a:br>
+              <a:rPr lang="fr-FR" dirty="0"/>
+            </a:br>
+            <a:r>
+              <a:rPr lang="fr-FR" dirty="0"/>
+              <a:t>J’ai </a:t>
+            </a:r>
+            <a:r>
+              <a:rPr lang="fr-FR" b="1" dirty="0"/>
+              <a:t>0 échec</a:t>
+            </a:r>
+            <a:r>
+              <a:rPr lang="fr-FR" dirty="0"/>
+              <a:t> et </a:t>
+            </a:r>
+            <a:r>
+              <a:rPr lang="fr-FR" b="1" dirty="0"/>
+              <a:t>100 % de réussite</a:t>
+            </a:r>
+            <a:r>
+              <a:rPr lang="fr-FR" dirty="0"/>
+              <a:t>.</a:t>
+            </a:r>
+            <a:br>
+              <a:rPr lang="fr-FR" dirty="0"/>
+            </a:br>
+            <a:r>
+              <a:rPr lang="fr-FR" dirty="0"/>
+              <a:t>Cela confirme que toutes mes validations sont bien en place et que le système réagit correctement dans chaque cas.</a:t>
+            </a:r>
+            <a:br>
+              <a:rPr lang="fr-FR" dirty="0"/>
+            </a:br>
+            <a:endParaRPr lang="fr-FR" dirty="0"/>
+          </a:p>
+        </p:txBody>
+      </p:sp>
+      <p:sp>
+        <p:nvSpPr>
+          <p:cNvPr id="4" name="Espace réservé du numéro de diapositive 3"/>
+          <p:cNvSpPr>
+            <a:spLocks noGrp="1"/>
+          </p:cNvSpPr>
+          <p:nvPr>
+            <p:ph type="sldNum" sz="quarter" idx="5"/>
+          </p:nvPr>
+        </p:nvSpPr>
+        <p:spPr/>
+        <p:txBody>
+          <a:bodyPr/>
+          <a:lstStyle/>
+          <a:p>
+            <a:fld id="{A07B8C24-F907-4392-B726-2485ED062295}" type="slidenum">
+              <a:rPr lang="fr-FR" smtClean="0"/>
+              <a:t>12</a:t>
+            </a:fld>
+            <a:endParaRPr lang="fr-FR"/>
+          </a:p>
+        </p:txBody>
+      </p:sp>
+    </p:spTree>
+    <p:extLst>
+      <p:ext uri="{BB962C8B-B14F-4D97-AF65-F5344CB8AC3E}">
+        <p14:creationId xmlns:p14="http://schemas.microsoft.com/office/powerpoint/2010/main" val="3893431452"/>
+      </p:ext>
+    </p:extLst>
+  </p:cSld>
+  <p:clrMapOvr>
+    <a:masterClrMapping/>
+  </p:clrMapOvr>
+</p:notes>
+</file>
+
+<file path=ppt/notesSlides/notesSlide12.xml><?xml version="1.0" encoding="utf-8"?>
+<p:notes xmlns:a="http://schemas.openxmlformats.org/drawingml/2006/main" xmlns:r="http://schemas.openxmlformats.org/officeDocument/2006/relationships" xmlns:p="http://schemas.openxmlformats.org/presentationml/2006/main">
+  <p:cSld>
+    <p:spTree>
+      <p:nvGrpSpPr>
+        <p:cNvPr id="1" name=""/>
+        <p:cNvGrpSpPr/>
+        <p:nvPr/>
+      </p:nvGrpSpPr>
+      <p:grpSpPr>
+        <a:xfrm>
+          <a:off x="0" y="0"/>
+          <a:ext cx="0" cy="0"/>
+          <a:chOff x="0" y="0"/>
+          <a:chExt cx="0" cy="0"/>
+        </a:xfrm>
+      </p:grpSpPr>
+      <p:sp>
+        <p:nvSpPr>
+          <p:cNvPr id="2" name="Espace réservé de l'image des diapositives 1"/>
+          <p:cNvSpPr>
+            <a:spLocks noGrp="1" noRot="1" noChangeAspect="1"/>
+          </p:cNvSpPr>
+          <p:nvPr>
+            <p:ph type="sldImg"/>
+          </p:nvPr>
+        </p:nvSpPr>
+        <p:spPr/>
+      </p:sp>
+      <p:sp>
+        <p:nvSpPr>
+          <p:cNvPr id="3" name="Espace réservé des notes 2"/>
+          <p:cNvSpPr>
+            <a:spLocks noGrp="1"/>
+          </p:cNvSpPr>
+          <p:nvPr>
+            <p:ph type="body" idx="1"/>
+          </p:nvPr>
+        </p:nvSpPr>
+        <p:spPr/>
+        <p:txBody>
+          <a:bodyPr/>
+          <a:lstStyle/>
+          <a:p>
+            <a:r>
+              <a:rPr lang="fr-FR" dirty="0"/>
+              <a:t>J’en ai profité pour faire un peu de nettoyage dans le code.</a:t>
+            </a:r>
+          </a:p>
+          <a:p>
+            <a:r>
+              <a:rPr lang="fr-FR" dirty="0"/>
+              <a:t>J’ai renommé les méthodes pour qu’elles soient plus lisibles.</a:t>
+            </a:r>
+          </a:p>
+          <a:p>
+            <a:r>
+              <a:rPr lang="fr-FR" dirty="0"/>
+              <a:t>J’ai supprimé les commentaires inutiles.</a:t>
+            </a:r>
+          </a:p>
+          <a:p>
+            <a:r>
+              <a:rPr lang="fr-FR" dirty="0"/>
+              <a:t>Et j’ai respecté les conventions de nommage en C#.</a:t>
+            </a:r>
+            <a:br>
+              <a:rPr lang="fr-FR" dirty="0"/>
+            </a:br>
+            <a:r>
+              <a:rPr lang="fr-FR" dirty="0"/>
+              <a:t>L’objectif était de livrer un code propre, facile à relire pour un autre développeur.</a:t>
+            </a:r>
+          </a:p>
+          <a:p>
+            <a:endParaRPr lang="fr-FR" dirty="0"/>
+          </a:p>
+        </p:txBody>
+      </p:sp>
+      <p:sp>
+        <p:nvSpPr>
+          <p:cNvPr id="4" name="Espace réservé du numéro de diapositive 3"/>
+          <p:cNvSpPr>
+            <a:spLocks noGrp="1"/>
+          </p:cNvSpPr>
+          <p:nvPr>
+            <p:ph type="sldNum" sz="quarter" idx="5"/>
+          </p:nvPr>
+        </p:nvSpPr>
+        <p:spPr/>
+        <p:txBody>
+          <a:bodyPr/>
+          <a:lstStyle/>
+          <a:p>
+            <a:fld id="{A07B8C24-F907-4392-B726-2485ED062295}" type="slidenum">
+              <a:rPr lang="fr-FR" smtClean="0"/>
+              <a:t>13</a:t>
+            </a:fld>
+            <a:endParaRPr lang="fr-FR"/>
+          </a:p>
+        </p:txBody>
+      </p:sp>
+    </p:spTree>
+    <p:extLst>
+      <p:ext uri="{BB962C8B-B14F-4D97-AF65-F5344CB8AC3E}">
+        <p14:creationId xmlns:p14="http://schemas.microsoft.com/office/powerpoint/2010/main" val="644306600"/>
+      </p:ext>
+    </p:extLst>
+  </p:cSld>
+  <p:clrMapOvr>
+    <a:masterClrMapping/>
+  </p:clrMapOvr>
+</p:notes>
+</file>
+
+<file path=ppt/notesSlides/notesSlide13.xml><?xml version="1.0" encoding="utf-8"?>
+<p:notes xmlns:a="http://schemas.openxmlformats.org/drawingml/2006/main" xmlns:r="http://schemas.openxmlformats.org/officeDocument/2006/relationships" xmlns:p="http://schemas.openxmlformats.org/presentationml/2006/main">
+  <p:cSld>
+    <p:spTree>
+      <p:nvGrpSpPr>
+        <p:cNvPr id="1" name=""/>
+        <p:cNvGrpSpPr/>
+        <p:nvPr/>
+      </p:nvGrpSpPr>
+      <p:grpSpPr>
+        <a:xfrm>
+          <a:off x="0" y="0"/>
+          <a:ext cx="0" cy="0"/>
+          <a:chOff x="0" y="0"/>
+          <a:chExt cx="0" cy="0"/>
+        </a:xfrm>
+      </p:grpSpPr>
+      <p:sp>
+        <p:nvSpPr>
+          <p:cNvPr id="2" name="Espace réservé de l'image des diapositives 1"/>
+          <p:cNvSpPr>
+            <a:spLocks noGrp="1" noRot="1" noChangeAspect="1"/>
+          </p:cNvSpPr>
+          <p:nvPr>
+            <p:ph type="sldImg"/>
+          </p:nvPr>
+        </p:nvSpPr>
+        <p:spPr/>
+      </p:sp>
+      <p:sp>
+        <p:nvSpPr>
+          <p:cNvPr id="3" name="Espace réservé des notes 2"/>
+          <p:cNvSpPr>
+            <a:spLocks noGrp="1"/>
+          </p:cNvSpPr>
+          <p:nvPr>
+            <p:ph type="body" idx="1"/>
+          </p:nvPr>
+        </p:nvSpPr>
+        <p:spPr/>
+        <p:txBody>
+          <a:bodyPr/>
+          <a:lstStyle/>
+          <a:p>
+            <a:r>
+              <a:rPr lang="fr-FR" dirty="0"/>
+              <a:t>Pour conclure, ce projet m’a permis de :</a:t>
+            </a:r>
+          </a:p>
+          <a:p>
+            <a:r>
+              <a:rPr lang="fr-FR" dirty="0"/>
+              <a:t>Prendre en main un projet existant,</a:t>
+            </a:r>
+          </a:p>
+          <a:p>
+            <a:r>
+              <a:rPr lang="fr-FR" dirty="0"/>
+              <a:t>Ajouter une nouvelle fonctionnalité,</a:t>
+            </a:r>
+          </a:p>
+          <a:p>
+            <a:r>
+              <a:rPr lang="fr-FR" dirty="0"/>
+              <a:t>Appliquer des règles métier concrètes,</a:t>
+            </a:r>
+          </a:p>
+          <a:p>
+            <a:r>
+              <a:rPr lang="fr-FR" dirty="0"/>
+              <a:t>Écrire des tests unitaires pour chaque cas.</a:t>
+            </a:r>
+            <a:br>
+              <a:rPr lang="fr-FR" dirty="0"/>
+            </a:br>
+            <a:r>
+              <a:rPr lang="fr-FR" dirty="0"/>
+              <a:t>J’ai appris à travailler proprement, à tester mon code, et à documenter mes résultats avec un protocole clair.</a:t>
+            </a:r>
+            <a:br>
+              <a:rPr lang="fr-FR" dirty="0"/>
+            </a:br>
+            <a:r>
+              <a:rPr lang="fr-FR" dirty="0"/>
+              <a:t>J’ai aussi mieux compris le rôle des services, des contrôleurs, et du pattern MVC en ASP.NET.</a:t>
+            </a:r>
+          </a:p>
+        </p:txBody>
+      </p:sp>
+      <p:sp>
+        <p:nvSpPr>
+          <p:cNvPr id="4" name="Espace réservé du numéro de diapositive 3"/>
+          <p:cNvSpPr>
+            <a:spLocks noGrp="1"/>
+          </p:cNvSpPr>
+          <p:nvPr>
+            <p:ph type="sldNum" sz="quarter" idx="5"/>
+          </p:nvPr>
+        </p:nvSpPr>
+        <p:spPr/>
+        <p:txBody>
+          <a:bodyPr/>
+          <a:lstStyle/>
+          <a:p>
+            <a:fld id="{A07B8C24-F907-4392-B726-2485ED062295}" type="slidenum">
+              <a:rPr lang="fr-FR" smtClean="0"/>
+              <a:t>14</a:t>
+            </a:fld>
+            <a:endParaRPr lang="fr-FR"/>
+          </a:p>
+        </p:txBody>
+      </p:sp>
+    </p:spTree>
+    <p:extLst>
+      <p:ext uri="{BB962C8B-B14F-4D97-AF65-F5344CB8AC3E}">
+        <p14:creationId xmlns:p14="http://schemas.microsoft.com/office/powerpoint/2010/main" val="2225595133"/>
+      </p:ext>
+    </p:extLst>
+  </p:cSld>
+  <p:clrMapOvr>
+    <a:masterClrMapping/>
+  </p:clrMapOvr>
+</p:notes>
+</file>
+
+<file path=ppt/notesSlides/notesSlide14.xml><?xml version="1.0" encoding="utf-8"?>
+<p:notes xmlns:a="http://schemas.openxmlformats.org/drawingml/2006/main" xmlns:r="http://schemas.openxmlformats.org/officeDocument/2006/relationships" xmlns:p="http://schemas.openxmlformats.org/presentationml/2006/main">
+  <p:cSld>
+    <p:spTree>
+      <p:nvGrpSpPr>
+        <p:cNvPr id="1" name=""/>
+        <p:cNvGrpSpPr/>
+        <p:nvPr/>
+      </p:nvGrpSpPr>
+      <p:grpSpPr>
+        <a:xfrm>
+          <a:off x="0" y="0"/>
+          <a:ext cx="0" cy="0"/>
+          <a:chOff x="0" y="0"/>
+          <a:chExt cx="0" cy="0"/>
+        </a:xfrm>
+      </p:grpSpPr>
+      <p:sp>
+        <p:nvSpPr>
+          <p:cNvPr id="2" name="Espace réservé de l'image des diapositives 1"/>
+          <p:cNvSpPr>
+            <a:spLocks noGrp="1" noRot="1" noChangeAspect="1"/>
+          </p:cNvSpPr>
+          <p:nvPr>
+            <p:ph type="sldImg"/>
+          </p:nvPr>
+        </p:nvSpPr>
+        <p:spPr/>
+      </p:sp>
+      <p:sp>
+        <p:nvSpPr>
+          <p:cNvPr id="3" name="Espace réservé des notes 2"/>
+          <p:cNvSpPr>
+            <a:spLocks noGrp="1"/>
+          </p:cNvSpPr>
+          <p:nvPr>
+            <p:ph type="body" idx="1"/>
+          </p:nvPr>
+        </p:nvSpPr>
+        <p:spPr/>
+        <p:txBody>
+          <a:bodyPr/>
+          <a:lstStyle/>
+          <a:p>
+            <a:r>
+              <a:rPr lang="fr-FR" dirty="0"/>
+              <a:t>Merci beaucoup pour votre attention.</a:t>
+            </a:r>
+            <a:br>
+              <a:rPr lang="fr-FR" dirty="0"/>
+            </a:br>
+            <a:r>
+              <a:rPr lang="fr-FR" dirty="0"/>
+              <a:t>Je suis prêt à répondre à toutes vos questions sur ma démarche, mes tests, le code, ou même mes difficultés.</a:t>
+            </a:r>
+          </a:p>
+          <a:p>
+            <a:r>
+              <a:rPr lang="fr-FR" dirty="0"/>
+              <a:t>J’ai utilisé un </a:t>
+            </a:r>
+            <a:r>
+              <a:rPr lang="fr-FR" dirty="0" err="1"/>
+              <a:t>FakeLocalizer</a:t>
+            </a:r>
+            <a:r>
+              <a:rPr lang="fr-FR" dirty="0"/>
+              <a:t> pour les tests. Il remplace le vrai traducteur et me renvoie juste la clé de l’erreur, comme ‘</a:t>
+            </a:r>
+            <a:r>
+              <a:rPr lang="fr-FR" dirty="0" err="1"/>
+              <a:t>MissingName</a:t>
+            </a:r>
+            <a:r>
+              <a:rPr lang="fr-FR" dirty="0"/>
+              <a:t>’. Comme ça, mes tests peuvent vérifier facilement si l’erreur est bien déclenchée.</a:t>
+            </a:r>
+          </a:p>
+        </p:txBody>
+      </p:sp>
+      <p:sp>
+        <p:nvSpPr>
+          <p:cNvPr id="4" name="Espace réservé du numéro de diapositive 3"/>
+          <p:cNvSpPr>
+            <a:spLocks noGrp="1"/>
+          </p:cNvSpPr>
+          <p:nvPr>
+            <p:ph type="sldNum" sz="quarter" idx="5"/>
+          </p:nvPr>
+        </p:nvSpPr>
+        <p:spPr/>
+        <p:txBody>
+          <a:bodyPr/>
+          <a:lstStyle/>
+          <a:p>
+            <a:fld id="{A07B8C24-F907-4392-B726-2485ED062295}" type="slidenum">
+              <a:rPr lang="fr-FR" smtClean="0"/>
+              <a:t>15</a:t>
+            </a:fld>
+            <a:endParaRPr lang="fr-FR"/>
+          </a:p>
+        </p:txBody>
+      </p:sp>
+    </p:spTree>
+    <p:extLst>
+      <p:ext uri="{BB962C8B-B14F-4D97-AF65-F5344CB8AC3E}">
+        <p14:creationId xmlns:p14="http://schemas.microsoft.com/office/powerpoint/2010/main" val="4038757403"/>
+      </p:ext>
+    </p:extLst>
+  </p:cSld>
+  <p:clrMapOvr>
+    <a:masterClrMapping/>
+  </p:clrMapOvr>
+</p:notes>
+</file>
+
+<file path=ppt/notesSlides/notesSlide2.xml><?xml version="1.0" encoding="utf-8"?>
+<p:notes xmlns:a="http://schemas.openxmlformats.org/drawingml/2006/main" xmlns:r="http://schemas.openxmlformats.org/officeDocument/2006/relationships" xmlns:p="http://schemas.openxmlformats.org/presentationml/2006/main">
+  <p:cSld>
+    <p:spTree>
+      <p:nvGrpSpPr>
+        <p:cNvPr id="1" name=""/>
+        <p:cNvGrpSpPr/>
+        <p:nvPr/>
+      </p:nvGrpSpPr>
+      <p:grpSpPr>
+        <a:xfrm>
+          <a:off x="0" y="0"/>
+          <a:ext cx="0" cy="0"/>
+          <a:chOff x="0" y="0"/>
+          <a:chExt cx="0" cy="0"/>
+        </a:xfrm>
+      </p:grpSpPr>
+      <p:sp>
+        <p:nvSpPr>
+          <p:cNvPr id="2" name="Espace réservé de l'image des diapositives 1"/>
+          <p:cNvSpPr>
+            <a:spLocks noGrp="1" noRot="1" noChangeAspect="1"/>
+          </p:cNvSpPr>
+          <p:nvPr>
+            <p:ph type="sldImg"/>
+          </p:nvPr>
+        </p:nvSpPr>
+        <p:spPr/>
+      </p:sp>
+      <p:sp>
+        <p:nvSpPr>
+          <p:cNvPr id="3" name="Espace réservé des notes 2"/>
+          <p:cNvSpPr>
+            <a:spLocks noGrp="1"/>
+          </p:cNvSpPr>
+          <p:nvPr>
+            <p:ph type="body" idx="1"/>
+          </p:nvPr>
+        </p:nvSpPr>
+        <p:spPr/>
+        <p:txBody>
+          <a:bodyPr/>
+          <a:lstStyle/>
+          <a:p>
+            <a:r>
+              <a:rPr lang="fr-FR" dirty="0"/>
+              <a:t>Le projet est une application Web ASP.NET </a:t>
+            </a:r>
+            <a:r>
+              <a:rPr lang="fr-FR" dirty="0" err="1"/>
+              <a:t>Core</a:t>
+            </a:r>
+            <a:r>
+              <a:rPr lang="fr-FR" dirty="0"/>
+              <a:t> qui permet de gérer un inventaire de produits.</a:t>
+            </a:r>
+            <a:br>
+              <a:rPr lang="fr-FR" dirty="0"/>
+            </a:br>
+            <a:r>
+              <a:rPr lang="fr-FR" dirty="0"/>
+              <a:t>C’est un outil interne, utilisé uniquement par les équipes de l’entreprise.</a:t>
+            </a:r>
+            <a:br>
+              <a:rPr lang="fr-FR" dirty="0"/>
+            </a:br>
+            <a:r>
+              <a:rPr lang="fr-FR" dirty="0"/>
+              <a:t>L’ancien développeur, Louis, avait posé les bases du projet, notamment le code pour ajouter des produits, mais il n’avait pas terminé la validation du formulaire.</a:t>
+            </a:r>
+            <a:br>
+              <a:rPr lang="fr-FR" dirty="0"/>
+            </a:br>
+            <a:r>
+              <a:rPr lang="fr-FR" dirty="0"/>
+              <a:t>Concrètement, on pouvait soumettre un produit vide, un prix non numérique ou une quantité négative, sans recevoir d’erreur.</a:t>
+            </a:r>
+            <a:br>
+              <a:rPr lang="fr-FR" dirty="0"/>
+            </a:br>
+            <a:r>
+              <a:rPr lang="fr-FR" dirty="0"/>
+              <a:t>J’ai donc dû corriger ça, mais sans modifier la logique existante, comme il m’a été demandé.</a:t>
+            </a:r>
+            <a:br>
+              <a:rPr lang="fr-FR" dirty="0"/>
+            </a:br>
+            <a:r>
+              <a:rPr lang="fr-FR" dirty="0"/>
+              <a:t>L’autre partie importante de ma mission était d’écrire des tests unitaires pour chaque règle, et de livrer un protocole de test complet.</a:t>
+            </a:r>
+          </a:p>
+        </p:txBody>
+      </p:sp>
+      <p:sp>
+        <p:nvSpPr>
+          <p:cNvPr id="4" name="Espace réservé du numéro de diapositive 3"/>
+          <p:cNvSpPr>
+            <a:spLocks noGrp="1"/>
+          </p:cNvSpPr>
+          <p:nvPr>
+            <p:ph type="sldNum" sz="quarter" idx="5"/>
+          </p:nvPr>
+        </p:nvSpPr>
+        <p:spPr/>
+        <p:txBody>
+          <a:bodyPr/>
+          <a:lstStyle/>
+          <a:p>
             <a:fld id="{104CE20C-1194-4FE2-9D48-27AFEDA9EB11}" type="slidenum">
               <a:rPr lang="fr-FR" smtClean="0"/>
               <a:t>2</a:t>
@@ -8246,6 +8921,1075 @@
     <p:extLst>
       <p:ext uri="{BB962C8B-B14F-4D97-AF65-F5344CB8AC3E}">
         <p14:creationId xmlns:p14="http://schemas.microsoft.com/office/powerpoint/2010/main" val="2911705920"/>
+      </p:ext>
+    </p:extLst>
+  </p:cSld>
+  <p:clrMapOvr>
+    <a:masterClrMapping/>
+  </p:clrMapOvr>
+</p:notes>
+</file>
+
+<file path=ppt/notesSlides/notesSlide3.xml><?xml version="1.0" encoding="utf-8"?>
+<p:notes xmlns:a="http://schemas.openxmlformats.org/drawingml/2006/main" xmlns:r="http://schemas.openxmlformats.org/officeDocument/2006/relationships" xmlns:p="http://schemas.openxmlformats.org/presentationml/2006/main">
+  <p:cSld>
+    <p:spTree>
+      <p:nvGrpSpPr>
+        <p:cNvPr id="1" name=""/>
+        <p:cNvGrpSpPr/>
+        <p:nvPr/>
+      </p:nvGrpSpPr>
+      <p:grpSpPr>
+        <a:xfrm>
+          <a:off x="0" y="0"/>
+          <a:ext cx="0" cy="0"/>
+          <a:chOff x="0" y="0"/>
+          <a:chExt cx="0" cy="0"/>
+        </a:xfrm>
+      </p:grpSpPr>
+      <p:sp>
+        <p:nvSpPr>
+          <p:cNvPr id="2" name="Espace réservé de l'image des diapositives 1"/>
+          <p:cNvSpPr>
+            <a:spLocks noGrp="1" noRot="1" noChangeAspect="1"/>
+          </p:cNvSpPr>
+          <p:nvPr>
+            <p:ph type="sldImg"/>
+          </p:nvPr>
+        </p:nvSpPr>
+        <p:spPr/>
+      </p:sp>
+      <p:sp>
+        <p:nvSpPr>
+          <p:cNvPr id="3" name="Espace réservé des notes 2"/>
+          <p:cNvSpPr>
+            <a:spLocks noGrp="1"/>
+          </p:cNvSpPr>
+          <p:nvPr>
+            <p:ph type="body" idx="1"/>
+          </p:nvPr>
+        </p:nvSpPr>
+        <p:spPr/>
+        <p:txBody>
+          <a:bodyPr/>
+          <a:lstStyle/>
+          <a:p>
+            <a:r>
+              <a:rPr lang="fr-FR" dirty="0"/>
+              <a:t>D’abord, </a:t>
+            </a:r>
+            <a:r>
+              <a:rPr lang="fr-FR" b="1" dirty="0"/>
+              <a:t>empêcher l’utilisateur de soumettre des données invalides</a:t>
+            </a:r>
+            <a:r>
+              <a:rPr lang="fr-FR" dirty="0"/>
+              <a:t> dans le formulaire.</a:t>
+            </a:r>
+            <a:br>
+              <a:rPr lang="fr-FR" dirty="0"/>
+            </a:br>
+            <a:r>
+              <a:rPr lang="fr-FR" dirty="0"/>
+              <a:t>Ensuite, </a:t>
+            </a:r>
+            <a:r>
+              <a:rPr lang="fr-FR" b="1" dirty="0"/>
+              <a:t>garantir que cette logique de validation fonctionne à 100 %</a:t>
+            </a:r>
+            <a:r>
+              <a:rPr lang="fr-FR" dirty="0"/>
+              <a:t> en écrivant des tests unitaires.</a:t>
+            </a:r>
+            <a:br>
+              <a:rPr lang="fr-FR" dirty="0"/>
+            </a:br>
+            <a:r>
+              <a:rPr lang="fr-FR" dirty="0"/>
+              <a:t>Je devais aussi respecter une contrainte importante : </a:t>
+            </a:r>
+            <a:r>
+              <a:rPr lang="fr-FR" b="1" dirty="0"/>
+              <a:t>ne pas modifier le cœur du code existant</a:t>
+            </a:r>
+            <a:r>
+              <a:rPr lang="fr-FR" dirty="0"/>
+              <a:t>, et m’appuyer sur la structure mise en place par Louis.</a:t>
+            </a:r>
+            <a:br>
+              <a:rPr lang="fr-FR" dirty="0"/>
+            </a:br>
+            <a:r>
+              <a:rPr lang="fr-FR" dirty="0"/>
+              <a:t>J’ai aussi complété le </a:t>
+            </a:r>
+            <a:r>
+              <a:rPr lang="fr-FR" b="1" dirty="0"/>
+              <a:t>document de protocole de test</a:t>
+            </a:r>
+            <a:r>
+              <a:rPr lang="fr-FR" dirty="0"/>
+              <a:t>, en suivant la méthode Arrange, </a:t>
+            </a:r>
+            <a:r>
+              <a:rPr lang="fr-FR" dirty="0" err="1"/>
+              <a:t>Act</a:t>
+            </a:r>
+            <a:r>
+              <a:rPr lang="fr-FR" dirty="0"/>
+              <a:t>, </a:t>
+            </a:r>
+            <a:r>
+              <a:rPr lang="fr-FR" dirty="0" err="1"/>
+              <a:t>Assert</a:t>
+            </a:r>
+            <a:r>
+              <a:rPr lang="fr-FR" dirty="0"/>
+              <a:t>, comme il m’a </a:t>
+            </a:r>
+            <a:r>
+              <a:rPr lang="fr-FR" dirty="0" err="1"/>
+              <a:t>ete</a:t>
+            </a:r>
+            <a:r>
+              <a:rPr lang="fr-FR" dirty="0"/>
+              <a:t> demandé</a:t>
+            </a:r>
+          </a:p>
+        </p:txBody>
+      </p:sp>
+      <p:sp>
+        <p:nvSpPr>
+          <p:cNvPr id="4" name="Espace réservé du numéro de diapositive 3"/>
+          <p:cNvSpPr>
+            <a:spLocks noGrp="1"/>
+          </p:cNvSpPr>
+          <p:nvPr>
+            <p:ph type="sldNum" sz="quarter" idx="5"/>
+          </p:nvPr>
+        </p:nvSpPr>
+        <p:spPr/>
+        <p:txBody>
+          <a:bodyPr/>
+          <a:lstStyle/>
+          <a:p>
+            <a:fld id="{A07B8C24-F907-4392-B726-2485ED062295}" type="slidenum">
+              <a:rPr lang="fr-FR" smtClean="0"/>
+              <a:t>3</a:t>
+            </a:fld>
+            <a:endParaRPr lang="fr-FR"/>
+          </a:p>
+        </p:txBody>
+      </p:sp>
+    </p:spTree>
+    <p:extLst>
+      <p:ext uri="{BB962C8B-B14F-4D97-AF65-F5344CB8AC3E}">
+        <p14:creationId xmlns:p14="http://schemas.microsoft.com/office/powerpoint/2010/main" val="4206446333"/>
+      </p:ext>
+    </p:extLst>
+  </p:cSld>
+  <p:clrMapOvr>
+    <a:masterClrMapping/>
+  </p:clrMapOvr>
+</p:notes>
+</file>
+
+<file path=ppt/notesSlides/notesSlide4.xml><?xml version="1.0" encoding="utf-8"?>
+<p:notes xmlns:a="http://schemas.openxmlformats.org/drawingml/2006/main" xmlns:r="http://schemas.openxmlformats.org/officeDocument/2006/relationships" xmlns:p="http://schemas.openxmlformats.org/presentationml/2006/main">
+  <p:cSld>
+    <p:spTree>
+      <p:nvGrpSpPr>
+        <p:cNvPr id="1" name=""/>
+        <p:cNvGrpSpPr/>
+        <p:nvPr/>
+      </p:nvGrpSpPr>
+      <p:grpSpPr>
+        <a:xfrm>
+          <a:off x="0" y="0"/>
+          <a:ext cx="0" cy="0"/>
+          <a:chOff x="0" y="0"/>
+          <a:chExt cx="0" cy="0"/>
+        </a:xfrm>
+      </p:grpSpPr>
+      <p:sp>
+        <p:nvSpPr>
+          <p:cNvPr id="2" name="Espace réservé de l'image des diapositives 1"/>
+          <p:cNvSpPr>
+            <a:spLocks noGrp="1" noRot="1" noChangeAspect="1"/>
+          </p:cNvSpPr>
+          <p:nvPr>
+            <p:ph type="sldImg"/>
+          </p:nvPr>
+        </p:nvSpPr>
+        <p:spPr/>
+      </p:sp>
+      <p:sp>
+        <p:nvSpPr>
+          <p:cNvPr id="3" name="Espace réservé des notes 2"/>
+          <p:cNvSpPr>
+            <a:spLocks noGrp="1"/>
+          </p:cNvSpPr>
+          <p:nvPr>
+            <p:ph type="body" idx="1"/>
+          </p:nvPr>
+        </p:nvSpPr>
+        <p:spPr/>
+        <p:txBody>
+          <a:bodyPr/>
+          <a:lstStyle/>
+          <a:p>
+            <a:r>
+              <a:rPr lang="fr-FR" dirty="0"/>
+              <a:t>J’ai combiné deux méthodes professionnelles :</a:t>
+            </a:r>
+            <a:br>
+              <a:rPr lang="fr-FR" dirty="0"/>
+            </a:br>
+            <a:r>
+              <a:rPr lang="fr-FR" dirty="0"/>
+              <a:t>D’abord la méthode </a:t>
+            </a:r>
+            <a:r>
+              <a:rPr lang="fr-FR" b="1" dirty="0"/>
+              <a:t>SMART</a:t>
+            </a:r>
+            <a:r>
+              <a:rPr lang="fr-FR" dirty="0"/>
+              <a:t> pour définir un objectif clair.</a:t>
+            </a:r>
+            <a:br>
+              <a:rPr lang="fr-FR" dirty="0"/>
+            </a:br>
+            <a:r>
+              <a:rPr lang="fr-FR" dirty="0"/>
+              <a:t>l’approche </a:t>
+            </a:r>
+            <a:r>
+              <a:rPr lang="fr-FR" b="1" dirty="0"/>
+              <a:t>AGILE</a:t>
+            </a:r>
+            <a:r>
+              <a:rPr lang="fr-FR" dirty="0"/>
+              <a:t>, pour travailler efficacement étape par étape.</a:t>
+            </a:r>
+          </a:p>
+          <a:p>
+            <a:r>
+              <a:rPr lang="fr-FR" dirty="0"/>
+              <a:t>L’outil de gestion </a:t>
+            </a:r>
+            <a:r>
+              <a:rPr lang="fr-FR" dirty="0" err="1"/>
+              <a:t>trello</a:t>
+            </a:r>
+            <a:r>
+              <a:rPr lang="fr-FR" dirty="0"/>
+              <a:t> afin de mieux m’organiser</a:t>
+            </a:r>
+          </a:p>
+          <a:p>
+            <a:r>
+              <a:rPr lang="fr-FR" dirty="0"/>
+              <a:t>Et le gestionnaire de sources </a:t>
+            </a:r>
+            <a:r>
+              <a:rPr lang="fr-FR" dirty="0" err="1"/>
+              <a:t>github</a:t>
+            </a:r>
+            <a:r>
+              <a:rPr lang="fr-FR" dirty="0"/>
+              <a:t> afin de </a:t>
+            </a:r>
+            <a:r>
+              <a:rPr lang="fr-FR" dirty="0" err="1"/>
+              <a:t>saiuvegarder</a:t>
+            </a:r>
+            <a:r>
+              <a:rPr lang="fr-FR" dirty="0"/>
+              <a:t> mes avancé et faire un retour en arrière si </a:t>
+            </a:r>
+            <a:r>
+              <a:rPr lang="fr-FR" dirty="0" err="1"/>
+              <a:t>bessoin</a:t>
+            </a:r>
+            <a:endParaRPr lang="fr-FR" dirty="0"/>
+          </a:p>
+          <a:p>
+            <a:endParaRPr lang="fr-FR" dirty="0"/>
+          </a:p>
+        </p:txBody>
+      </p:sp>
+      <p:sp>
+        <p:nvSpPr>
+          <p:cNvPr id="4" name="Espace réservé du numéro de diapositive 3"/>
+          <p:cNvSpPr>
+            <a:spLocks noGrp="1"/>
+          </p:cNvSpPr>
+          <p:nvPr>
+            <p:ph type="sldNum" sz="quarter" idx="5"/>
+          </p:nvPr>
+        </p:nvSpPr>
+        <p:spPr/>
+        <p:txBody>
+          <a:bodyPr/>
+          <a:lstStyle/>
+          <a:p>
+            <a:fld id="{A07B8C24-F907-4392-B726-2485ED062295}" type="slidenum">
+              <a:rPr lang="fr-FR" smtClean="0"/>
+              <a:t>5</a:t>
+            </a:fld>
+            <a:endParaRPr lang="fr-FR"/>
+          </a:p>
+        </p:txBody>
+      </p:sp>
+    </p:spTree>
+    <p:extLst>
+      <p:ext uri="{BB962C8B-B14F-4D97-AF65-F5344CB8AC3E}">
+        <p14:creationId xmlns:p14="http://schemas.microsoft.com/office/powerpoint/2010/main" val="755662009"/>
+      </p:ext>
+    </p:extLst>
+  </p:cSld>
+  <p:clrMapOvr>
+    <a:masterClrMapping/>
+  </p:clrMapOvr>
+</p:notes>
+</file>
+
+<file path=ppt/notesSlides/notesSlide5.xml><?xml version="1.0" encoding="utf-8"?>
+<p:notes xmlns:a="http://schemas.openxmlformats.org/drawingml/2006/main" xmlns:r="http://schemas.openxmlformats.org/officeDocument/2006/relationships" xmlns:p="http://schemas.openxmlformats.org/presentationml/2006/main">
+  <p:cSld>
+    <p:spTree>
+      <p:nvGrpSpPr>
+        <p:cNvPr id="1" name=""/>
+        <p:cNvGrpSpPr/>
+        <p:nvPr/>
+      </p:nvGrpSpPr>
+      <p:grpSpPr>
+        <a:xfrm>
+          <a:off x="0" y="0"/>
+          <a:ext cx="0" cy="0"/>
+          <a:chOff x="0" y="0"/>
+          <a:chExt cx="0" cy="0"/>
+        </a:xfrm>
+      </p:grpSpPr>
+      <p:sp>
+        <p:nvSpPr>
+          <p:cNvPr id="2" name="Espace réservé de l'image des diapositives 1"/>
+          <p:cNvSpPr>
+            <a:spLocks noGrp="1" noRot="1" noChangeAspect="1"/>
+          </p:cNvSpPr>
+          <p:nvPr>
+            <p:ph type="sldImg"/>
+          </p:nvPr>
+        </p:nvSpPr>
+        <p:spPr/>
+      </p:sp>
+      <p:sp>
+        <p:nvSpPr>
+          <p:cNvPr id="3" name="Espace réservé des notes 2"/>
+          <p:cNvSpPr>
+            <a:spLocks noGrp="1"/>
+          </p:cNvSpPr>
+          <p:nvPr>
+            <p:ph type="body" idx="1"/>
+          </p:nvPr>
+        </p:nvSpPr>
+        <p:spPr/>
+        <p:txBody>
+          <a:bodyPr/>
+          <a:lstStyle/>
+          <a:p>
+            <a:r>
+              <a:rPr lang="fr-FR" dirty="0"/>
+              <a:t>Pour commencer, j’ai lu les notes de Louis. Elles contiennent les règles de validation attendues et quelques indications sur le code à utiliser.</a:t>
+            </a:r>
+            <a:br>
+              <a:rPr lang="fr-FR" dirty="0"/>
+            </a:br>
+            <a:r>
+              <a:rPr lang="fr-FR" dirty="0"/>
+              <a:t>Ensuite, j’ai exploré le code existant, notamment les fichiers </a:t>
+            </a:r>
+            <a:r>
+              <a:rPr lang="fr-FR" dirty="0" err="1"/>
+              <a:t>ProductController.cs</a:t>
+            </a:r>
+            <a:r>
+              <a:rPr lang="fr-FR" dirty="0"/>
+              <a:t> et </a:t>
+            </a:r>
+            <a:r>
+              <a:rPr lang="fr-FR" dirty="0" err="1"/>
+              <a:t>ProductService.cs</a:t>
+            </a:r>
+            <a:r>
+              <a:rPr lang="fr-FR" dirty="0"/>
+              <a:t>, pour comprendre comment était structuré le module.</a:t>
+            </a:r>
+            <a:br>
+              <a:rPr lang="fr-FR" dirty="0"/>
+            </a:br>
+            <a:r>
+              <a:rPr lang="fr-FR" dirty="0"/>
+              <a:t>J’ai repéré la méthode </a:t>
+            </a:r>
+            <a:r>
+              <a:rPr lang="fr-FR" dirty="0" err="1"/>
+              <a:t>Create</a:t>
+            </a:r>
+            <a:r>
+              <a:rPr lang="fr-FR" dirty="0"/>
+              <a:t>() dans le contrôleur, et j’ai vu que le traitement des erreurs devait se faire dans </a:t>
+            </a:r>
+            <a:r>
+              <a:rPr lang="fr-FR" dirty="0" err="1"/>
+              <a:t>ProductService</a:t>
+            </a:r>
+            <a:r>
+              <a:rPr lang="fr-FR" dirty="0"/>
+              <a:t>.</a:t>
+            </a:r>
+            <a:br>
+              <a:rPr lang="fr-FR" dirty="0"/>
+            </a:br>
+            <a:r>
+              <a:rPr lang="fr-FR" dirty="0"/>
+              <a:t>Ensuite, j’ai écrit la méthode </a:t>
+            </a:r>
+            <a:r>
+              <a:rPr lang="fr-FR" dirty="0" err="1"/>
+              <a:t>CheckProductModelErrors</a:t>
+            </a:r>
+            <a:r>
+              <a:rPr lang="fr-FR" dirty="0"/>
+              <a:t>, qui applique toutes les règles métier.</a:t>
+            </a:r>
+            <a:br>
+              <a:rPr lang="fr-FR" dirty="0"/>
+            </a:br>
+            <a:r>
+              <a:rPr lang="fr-FR" dirty="0"/>
+              <a:t>Une fois cette validation terminée, j’ai créé 7 tests unitaires, chacun correspondant à une règle.</a:t>
+            </a:r>
+            <a:br>
+              <a:rPr lang="fr-FR" dirty="0"/>
+            </a:br>
+            <a:r>
+              <a:rPr lang="fr-FR" dirty="0"/>
+              <a:t>Enfin, j’ai vérifié dans Visual Studio que tous les tests passaient, et j’ai rempli le fichier protocole de test en suivant la méthode Arrange / </a:t>
+            </a:r>
+            <a:r>
+              <a:rPr lang="fr-FR" dirty="0" err="1"/>
+              <a:t>Act</a:t>
+            </a:r>
+            <a:r>
+              <a:rPr lang="fr-FR" dirty="0"/>
+              <a:t> / </a:t>
+            </a:r>
+            <a:r>
+              <a:rPr lang="fr-FR" dirty="0" err="1"/>
+              <a:t>Assert</a:t>
+            </a:r>
+            <a:r>
+              <a:rPr lang="fr-FR" dirty="0"/>
+              <a:t>.</a:t>
+            </a:r>
+          </a:p>
+        </p:txBody>
+      </p:sp>
+      <p:sp>
+        <p:nvSpPr>
+          <p:cNvPr id="4" name="Espace réservé du numéro de diapositive 3"/>
+          <p:cNvSpPr>
+            <a:spLocks noGrp="1"/>
+          </p:cNvSpPr>
+          <p:nvPr>
+            <p:ph type="sldNum" sz="quarter" idx="5"/>
+          </p:nvPr>
+        </p:nvSpPr>
+        <p:spPr/>
+        <p:txBody>
+          <a:bodyPr/>
+          <a:lstStyle/>
+          <a:p>
+            <a:fld id="{A07B8C24-F907-4392-B726-2485ED062295}" type="slidenum">
+              <a:rPr lang="fr-FR" smtClean="0"/>
+              <a:t>6</a:t>
+            </a:fld>
+            <a:endParaRPr lang="fr-FR"/>
+          </a:p>
+        </p:txBody>
+      </p:sp>
+    </p:spTree>
+    <p:extLst>
+      <p:ext uri="{BB962C8B-B14F-4D97-AF65-F5344CB8AC3E}">
+        <p14:creationId xmlns:p14="http://schemas.microsoft.com/office/powerpoint/2010/main" val="4269829571"/>
+      </p:ext>
+    </p:extLst>
+  </p:cSld>
+  <p:clrMapOvr>
+    <a:masterClrMapping/>
+  </p:clrMapOvr>
+</p:notes>
+</file>
+
+<file path=ppt/notesSlides/notesSlide6.xml><?xml version="1.0" encoding="utf-8"?>
+<p:notes xmlns:a="http://schemas.openxmlformats.org/drawingml/2006/main" xmlns:r="http://schemas.openxmlformats.org/officeDocument/2006/relationships" xmlns:p="http://schemas.openxmlformats.org/presentationml/2006/main">
+  <p:cSld>
+    <p:spTree>
+      <p:nvGrpSpPr>
+        <p:cNvPr id="1" name=""/>
+        <p:cNvGrpSpPr/>
+        <p:nvPr/>
+      </p:nvGrpSpPr>
+      <p:grpSpPr>
+        <a:xfrm>
+          <a:off x="0" y="0"/>
+          <a:ext cx="0" cy="0"/>
+          <a:chOff x="0" y="0"/>
+          <a:chExt cx="0" cy="0"/>
+        </a:xfrm>
+      </p:grpSpPr>
+      <p:sp>
+        <p:nvSpPr>
+          <p:cNvPr id="2" name="Espace réservé de l'image des diapositives 1"/>
+          <p:cNvSpPr>
+            <a:spLocks noGrp="1" noRot="1" noChangeAspect="1"/>
+          </p:cNvSpPr>
+          <p:nvPr>
+            <p:ph type="sldImg"/>
+          </p:nvPr>
+        </p:nvSpPr>
+        <p:spPr/>
+      </p:sp>
+      <p:sp>
+        <p:nvSpPr>
+          <p:cNvPr id="3" name="Espace réservé des notes 2"/>
+          <p:cNvSpPr>
+            <a:spLocks noGrp="1"/>
+          </p:cNvSpPr>
+          <p:nvPr>
+            <p:ph type="body" idx="1"/>
+          </p:nvPr>
+        </p:nvSpPr>
+        <p:spPr/>
+        <p:txBody>
+          <a:bodyPr/>
+          <a:lstStyle/>
+          <a:p>
+            <a:r>
+              <a:rPr lang="fr-FR" dirty="0"/>
+              <a:t>Voici les 7 règles métier que j’ai dû implémenter :</a:t>
+            </a:r>
+          </a:p>
+          <a:p>
+            <a:r>
+              <a:rPr lang="fr-FR" dirty="0"/>
+              <a:t>Le champ </a:t>
+            </a:r>
+            <a:r>
+              <a:rPr lang="fr-FR" b="1" dirty="0"/>
+              <a:t>Nom</a:t>
+            </a:r>
+            <a:r>
+              <a:rPr lang="fr-FR" dirty="0"/>
+              <a:t> est obligatoire.</a:t>
+            </a:r>
+          </a:p>
+          <a:p>
+            <a:r>
+              <a:rPr lang="fr-FR" dirty="0"/>
+              <a:t>Le </a:t>
+            </a:r>
+            <a:r>
+              <a:rPr lang="fr-FR" b="1" dirty="0"/>
+              <a:t>Prix</a:t>
+            </a:r>
+            <a:r>
+              <a:rPr lang="fr-FR" dirty="0"/>
+              <a:t> est obligatoire, il doit être un </a:t>
+            </a:r>
+            <a:r>
+              <a:rPr lang="fr-FR" b="1" dirty="0"/>
+              <a:t>nombre</a:t>
+            </a:r>
+            <a:r>
+              <a:rPr lang="fr-FR" dirty="0"/>
+              <a:t>, et il doit être </a:t>
+            </a:r>
+            <a:r>
+              <a:rPr lang="fr-FR" b="1" dirty="0"/>
+              <a:t>strictement supérieur à 0</a:t>
+            </a:r>
+            <a:r>
+              <a:rPr lang="fr-FR" dirty="0"/>
+              <a:t>.</a:t>
+            </a:r>
+          </a:p>
+          <a:p>
+            <a:r>
+              <a:rPr lang="fr-FR" dirty="0"/>
+              <a:t>La </a:t>
+            </a:r>
+            <a:r>
+              <a:rPr lang="fr-FR" b="1" dirty="0"/>
+              <a:t>Quantité</a:t>
+            </a:r>
+            <a:r>
+              <a:rPr lang="fr-FR" dirty="0"/>
+              <a:t> est obligatoire, elle doit être un </a:t>
+            </a:r>
+            <a:r>
+              <a:rPr lang="fr-FR" b="1" dirty="0"/>
+              <a:t>entier</a:t>
+            </a:r>
+            <a:r>
+              <a:rPr lang="fr-FR" dirty="0"/>
+              <a:t>, et elle doit aussi être </a:t>
+            </a:r>
+            <a:r>
+              <a:rPr lang="fr-FR" b="1" dirty="0"/>
+              <a:t>strictement supérieure à 0</a:t>
+            </a:r>
+            <a:r>
+              <a:rPr lang="fr-FR" dirty="0"/>
+              <a:t>.</a:t>
+            </a:r>
+            <a:br>
+              <a:rPr lang="fr-FR" dirty="0"/>
+            </a:br>
+            <a:r>
+              <a:rPr lang="fr-FR" dirty="0"/>
+              <a:t>Ces règles sont simples, mais essentielles pour éviter des erreurs en base de données ou des comportements inattendus dans l’application.</a:t>
+            </a:r>
+            <a:br>
+              <a:rPr lang="fr-FR" dirty="0"/>
+            </a:br>
+            <a:r>
+              <a:rPr lang="fr-FR" dirty="0"/>
+              <a:t>Si on laisse passer un prix vide ou une quantité négative, ça peut entraîner des bugs plus graves plus tard.</a:t>
+            </a:r>
+          </a:p>
+        </p:txBody>
+      </p:sp>
+      <p:sp>
+        <p:nvSpPr>
+          <p:cNvPr id="4" name="Espace réservé du numéro de diapositive 3"/>
+          <p:cNvSpPr>
+            <a:spLocks noGrp="1"/>
+          </p:cNvSpPr>
+          <p:nvPr>
+            <p:ph type="sldNum" sz="quarter" idx="5"/>
+          </p:nvPr>
+        </p:nvSpPr>
+        <p:spPr/>
+        <p:txBody>
+          <a:bodyPr/>
+          <a:lstStyle/>
+          <a:p>
+            <a:fld id="{A07B8C24-F907-4392-B726-2485ED062295}" type="slidenum">
+              <a:rPr lang="fr-FR" smtClean="0"/>
+              <a:t>7</a:t>
+            </a:fld>
+            <a:endParaRPr lang="fr-FR"/>
+          </a:p>
+        </p:txBody>
+      </p:sp>
+    </p:spTree>
+    <p:extLst>
+      <p:ext uri="{BB962C8B-B14F-4D97-AF65-F5344CB8AC3E}">
+        <p14:creationId xmlns:p14="http://schemas.microsoft.com/office/powerpoint/2010/main" val="1889346430"/>
+      </p:ext>
+    </p:extLst>
+  </p:cSld>
+  <p:clrMapOvr>
+    <a:masterClrMapping/>
+  </p:clrMapOvr>
+</p:notes>
+</file>
+
+<file path=ppt/notesSlides/notesSlide7.xml><?xml version="1.0" encoding="utf-8"?>
+<p:notes xmlns:a="http://schemas.openxmlformats.org/drawingml/2006/main" xmlns:r="http://schemas.openxmlformats.org/officeDocument/2006/relationships" xmlns:p="http://schemas.openxmlformats.org/presentationml/2006/main">
+  <p:cSld>
+    <p:spTree>
+      <p:nvGrpSpPr>
+        <p:cNvPr id="1" name=""/>
+        <p:cNvGrpSpPr/>
+        <p:nvPr/>
+      </p:nvGrpSpPr>
+      <p:grpSpPr>
+        <a:xfrm>
+          <a:off x="0" y="0"/>
+          <a:ext cx="0" cy="0"/>
+          <a:chOff x="0" y="0"/>
+          <a:chExt cx="0" cy="0"/>
+        </a:xfrm>
+      </p:grpSpPr>
+      <p:sp>
+        <p:nvSpPr>
+          <p:cNvPr id="2" name="Espace réservé de l'image des diapositives 1"/>
+          <p:cNvSpPr>
+            <a:spLocks noGrp="1" noRot="1" noChangeAspect="1"/>
+          </p:cNvSpPr>
+          <p:nvPr>
+            <p:ph type="sldImg"/>
+          </p:nvPr>
+        </p:nvSpPr>
+        <p:spPr/>
+      </p:sp>
+      <p:sp>
+        <p:nvSpPr>
+          <p:cNvPr id="3" name="Espace réservé des notes 2"/>
+          <p:cNvSpPr>
+            <a:spLocks noGrp="1"/>
+          </p:cNvSpPr>
+          <p:nvPr>
+            <p:ph type="body" idx="1"/>
+          </p:nvPr>
+        </p:nvSpPr>
+        <p:spPr/>
+        <p:txBody>
+          <a:bodyPr/>
+          <a:lstStyle/>
+          <a:p>
+            <a:r>
+              <a:rPr lang="fr-FR" dirty="0"/>
+              <a:t>Voici un extrait de ma méthode </a:t>
+            </a:r>
+            <a:r>
+              <a:rPr lang="fr-FR" dirty="0" err="1"/>
+              <a:t>CheckProductModelErrors</a:t>
+            </a:r>
+            <a:r>
+              <a:rPr lang="fr-FR" dirty="0"/>
+              <a:t> dans la classe </a:t>
+            </a:r>
+            <a:r>
+              <a:rPr lang="fr-FR" dirty="0" err="1"/>
+              <a:t>ProductService</a:t>
+            </a:r>
+            <a:r>
+              <a:rPr lang="fr-FR" dirty="0"/>
+              <a:t>.</a:t>
+            </a:r>
+            <a:br>
+              <a:rPr lang="fr-FR" dirty="0"/>
+            </a:br>
+            <a:r>
+              <a:rPr lang="fr-FR" dirty="0"/>
+              <a:t>Cette méthode prend un </a:t>
+            </a:r>
+            <a:r>
+              <a:rPr lang="fr-FR" dirty="0" err="1"/>
+              <a:t>ProductViewModel</a:t>
+            </a:r>
+            <a:r>
+              <a:rPr lang="fr-FR" dirty="0"/>
+              <a:t>, vérifie chaque champ un par un, et ajoute un message d’erreur si une règle n’est pas respectée.</a:t>
+            </a:r>
+            <a:br>
+              <a:rPr lang="fr-FR" dirty="0"/>
+            </a:br>
+            <a:r>
+              <a:rPr lang="fr-FR" dirty="0"/>
+              <a:t>Par exemple, si le champ Nom est vide, on ajoute "</a:t>
+            </a:r>
+            <a:r>
+              <a:rPr lang="fr-FR" dirty="0" err="1"/>
+              <a:t>MissingName</a:t>
+            </a:r>
+            <a:r>
+              <a:rPr lang="fr-FR" dirty="0"/>
+              <a:t>" à la liste d’erreurs.</a:t>
+            </a:r>
+            <a:br>
+              <a:rPr lang="fr-FR" dirty="0"/>
+            </a:br>
+            <a:r>
+              <a:rPr lang="fr-FR" dirty="0"/>
+              <a:t>Ce message est ensuite affiché dans la vue.</a:t>
+            </a:r>
+            <a:br>
+              <a:rPr lang="fr-FR" dirty="0"/>
+            </a:br>
+            <a:r>
+              <a:rPr lang="fr-FR" dirty="0"/>
+              <a:t>J’ai aussi utilisé un objet </a:t>
+            </a:r>
+            <a:r>
+              <a:rPr lang="fr-FR" dirty="0" err="1"/>
+              <a:t>localizer</a:t>
+            </a:r>
+            <a:r>
+              <a:rPr lang="fr-FR" dirty="0"/>
+              <a:t> pour gérer les erreurs dans différentes langues. Mais dans mes tests, j’ai utilisé un </a:t>
+            </a:r>
+            <a:r>
+              <a:rPr lang="fr-FR" dirty="0" err="1"/>
+              <a:t>FakeLocalizer</a:t>
+            </a:r>
+            <a:r>
+              <a:rPr lang="fr-FR" dirty="0"/>
+              <a:t>, un faux traducteur qui me rend juste le nom de l’erreur, comme "</a:t>
+            </a:r>
+            <a:r>
+              <a:rPr lang="fr-FR" dirty="0" err="1"/>
+              <a:t>MissingName</a:t>
+            </a:r>
+            <a:r>
+              <a:rPr lang="fr-FR" dirty="0"/>
+              <a:t>", pour simplifier les vérifications.</a:t>
+            </a:r>
+          </a:p>
+        </p:txBody>
+      </p:sp>
+      <p:sp>
+        <p:nvSpPr>
+          <p:cNvPr id="4" name="Espace réservé du numéro de diapositive 3"/>
+          <p:cNvSpPr>
+            <a:spLocks noGrp="1"/>
+          </p:cNvSpPr>
+          <p:nvPr>
+            <p:ph type="sldNum" sz="quarter" idx="5"/>
+          </p:nvPr>
+        </p:nvSpPr>
+        <p:spPr/>
+        <p:txBody>
+          <a:bodyPr/>
+          <a:lstStyle/>
+          <a:p>
+            <a:fld id="{A07B8C24-F907-4392-B726-2485ED062295}" type="slidenum">
+              <a:rPr lang="fr-FR" smtClean="0"/>
+              <a:t>8</a:t>
+            </a:fld>
+            <a:endParaRPr lang="fr-FR"/>
+          </a:p>
+        </p:txBody>
+      </p:sp>
+    </p:spTree>
+    <p:extLst>
+      <p:ext uri="{BB962C8B-B14F-4D97-AF65-F5344CB8AC3E}">
+        <p14:creationId xmlns:p14="http://schemas.microsoft.com/office/powerpoint/2010/main" val="779447695"/>
+      </p:ext>
+    </p:extLst>
+  </p:cSld>
+  <p:clrMapOvr>
+    <a:masterClrMapping/>
+  </p:clrMapOvr>
+</p:notes>
+</file>
+
+<file path=ppt/notesSlides/notesSlide8.xml><?xml version="1.0" encoding="utf-8"?>
+<p:notes xmlns:a="http://schemas.openxmlformats.org/drawingml/2006/main" xmlns:r="http://schemas.openxmlformats.org/officeDocument/2006/relationships" xmlns:p="http://schemas.openxmlformats.org/presentationml/2006/main">
+  <p:cSld>
+    <p:spTree>
+      <p:nvGrpSpPr>
+        <p:cNvPr id="1" name=""/>
+        <p:cNvGrpSpPr/>
+        <p:nvPr/>
+      </p:nvGrpSpPr>
+      <p:grpSpPr>
+        <a:xfrm>
+          <a:off x="0" y="0"/>
+          <a:ext cx="0" cy="0"/>
+          <a:chOff x="0" y="0"/>
+          <a:chExt cx="0" cy="0"/>
+        </a:xfrm>
+      </p:grpSpPr>
+      <p:sp>
+        <p:nvSpPr>
+          <p:cNvPr id="2" name="Espace réservé de l'image des diapositives 1"/>
+          <p:cNvSpPr>
+            <a:spLocks noGrp="1" noRot="1" noChangeAspect="1"/>
+          </p:cNvSpPr>
+          <p:nvPr>
+            <p:ph type="sldImg"/>
+          </p:nvPr>
+        </p:nvSpPr>
+        <p:spPr/>
+      </p:sp>
+      <p:sp>
+        <p:nvSpPr>
+          <p:cNvPr id="3" name="Espace réservé des notes 2"/>
+          <p:cNvSpPr>
+            <a:spLocks noGrp="1"/>
+          </p:cNvSpPr>
+          <p:nvPr>
+            <p:ph type="body" idx="1"/>
+          </p:nvPr>
+        </p:nvSpPr>
+        <p:spPr/>
+        <p:txBody>
+          <a:bodyPr/>
+          <a:lstStyle/>
+          <a:p>
+            <a:r>
+              <a:rPr lang="fr-FR" dirty="0"/>
+              <a:t>Les tests unitaires sont très importants dans un projet, même petit. Ils permettent de s’assurer que le code fonctionne comme prévu, et surtout que les règles métier sont bien respectées.</a:t>
+            </a:r>
+            <a:br>
+              <a:rPr lang="fr-FR" dirty="0"/>
+            </a:br>
+            <a:r>
+              <a:rPr lang="fr-FR" dirty="0"/>
+              <a:t>Si un autre développeur modifie la validation plus tard, on pourra relancer les tests pour vérifier que tout marche encore.</a:t>
+            </a:r>
+            <a:br>
+              <a:rPr lang="fr-FR" dirty="0"/>
+            </a:br>
+            <a:r>
+              <a:rPr lang="fr-FR" dirty="0"/>
+              <a:t>C’est une forme d’assurance qualité. Ça évite aussi les erreurs cachées ou les effets de bord.</a:t>
+            </a:r>
+            <a:br>
+              <a:rPr lang="fr-FR" dirty="0"/>
+            </a:br>
+            <a:r>
+              <a:rPr lang="fr-FR" dirty="0"/>
+              <a:t>Dans ce projet, j’ai décidé de faire un test pour chaque règle, pour être sûr de bien tout couvrir.</a:t>
+            </a:r>
+          </a:p>
+        </p:txBody>
+      </p:sp>
+      <p:sp>
+        <p:nvSpPr>
+          <p:cNvPr id="4" name="Espace réservé du numéro de diapositive 3"/>
+          <p:cNvSpPr>
+            <a:spLocks noGrp="1"/>
+          </p:cNvSpPr>
+          <p:nvPr>
+            <p:ph type="sldNum" sz="quarter" idx="5"/>
+          </p:nvPr>
+        </p:nvSpPr>
+        <p:spPr/>
+        <p:txBody>
+          <a:bodyPr/>
+          <a:lstStyle/>
+          <a:p>
+            <a:fld id="{A07B8C24-F907-4392-B726-2485ED062295}" type="slidenum">
+              <a:rPr lang="fr-FR" smtClean="0"/>
+              <a:t>9</a:t>
+            </a:fld>
+            <a:endParaRPr lang="fr-FR"/>
+          </a:p>
+        </p:txBody>
+      </p:sp>
+    </p:spTree>
+    <p:extLst>
+      <p:ext uri="{BB962C8B-B14F-4D97-AF65-F5344CB8AC3E}">
+        <p14:creationId xmlns:p14="http://schemas.microsoft.com/office/powerpoint/2010/main" val="881653200"/>
+      </p:ext>
+    </p:extLst>
+  </p:cSld>
+  <p:clrMapOvr>
+    <a:masterClrMapping/>
+  </p:clrMapOvr>
+</p:notes>
+</file>
+
+<file path=ppt/notesSlides/notesSlide9.xml><?xml version="1.0" encoding="utf-8"?>
+<p:notes xmlns:a="http://schemas.openxmlformats.org/drawingml/2006/main" xmlns:r="http://schemas.openxmlformats.org/officeDocument/2006/relationships" xmlns:p="http://schemas.openxmlformats.org/presentationml/2006/main">
+  <p:cSld>
+    <p:spTree>
+      <p:nvGrpSpPr>
+        <p:cNvPr id="1" name=""/>
+        <p:cNvGrpSpPr/>
+        <p:nvPr/>
+      </p:nvGrpSpPr>
+      <p:grpSpPr>
+        <a:xfrm>
+          <a:off x="0" y="0"/>
+          <a:ext cx="0" cy="0"/>
+          <a:chOff x="0" y="0"/>
+          <a:chExt cx="0" cy="0"/>
+        </a:xfrm>
+      </p:grpSpPr>
+      <p:sp>
+        <p:nvSpPr>
+          <p:cNvPr id="2" name="Espace réservé de l'image des diapositives 1"/>
+          <p:cNvSpPr>
+            <a:spLocks noGrp="1" noRot="1" noChangeAspect="1"/>
+          </p:cNvSpPr>
+          <p:nvPr>
+            <p:ph type="sldImg"/>
+          </p:nvPr>
+        </p:nvSpPr>
+        <p:spPr/>
+      </p:sp>
+      <p:sp>
+        <p:nvSpPr>
+          <p:cNvPr id="3" name="Espace réservé des notes 2"/>
+          <p:cNvSpPr>
+            <a:spLocks noGrp="1"/>
+          </p:cNvSpPr>
+          <p:nvPr>
+            <p:ph type="body" idx="1"/>
+          </p:nvPr>
+        </p:nvSpPr>
+        <p:spPr/>
+        <p:txBody>
+          <a:bodyPr/>
+          <a:lstStyle/>
+          <a:p>
+            <a:r>
+              <a:rPr lang="fr-FR" dirty="0"/>
+              <a:t>J’ai donc écrit 7 tests unitaires, un pour chaque règle métier :</a:t>
+            </a:r>
+          </a:p>
+          <a:p>
+            <a:r>
+              <a:rPr lang="fr-FR" dirty="0"/>
+              <a:t>1 test pour vérifier que le nom est bien obligatoire.</a:t>
+            </a:r>
+          </a:p>
+          <a:p>
+            <a:r>
+              <a:rPr lang="fr-FR" dirty="0"/>
+              <a:t>3 tests pour le prix : vide, pas un nombre, ou égal à 0.</a:t>
+            </a:r>
+          </a:p>
+          <a:p>
+            <a:r>
+              <a:rPr lang="fr-FR" dirty="0"/>
+              <a:t>3 tests pour la quantité : vide, pas un entier, ou négative.</a:t>
+            </a:r>
+            <a:br>
+              <a:rPr lang="fr-FR" dirty="0"/>
+            </a:br>
+            <a:r>
+              <a:rPr lang="fr-FR" dirty="0"/>
+              <a:t>Chaque test suit toujours le même modèle : je crée un produit invalide, je lance la méthode de validation, et je vérifie qu’elle renvoie le bon message d’erreur.</a:t>
+            </a:r>
+          </a:p>
+        </p:txBody>
+      </p:sp>
+      <p:sp>
+        <p:nvSpPr>
+          <p:cNvPr id="4" name="Espace réservé du numéro de diapositive 3"/>
+          <p:cNvSpPr>
+            <a:spLocks noGrp="1"/>
+          </p:cNvSpPr>
+          <p:nvPr>
+            <p:ph type="sldNum" sz="quarter" idx="5"/>
+          </p:nvPr>
+        </p:nvSpPr>
+        <p:spPr/>
+        <p:txBody>
+          <a:bodyPr/>
+          <a:lstStyle/>
+          <a:p>
+            <a:fld id="{A07B8C24-F907-4392-B726-2485ED062295}" type="slidenum">
+              <a:rPr lang="fr-FR" smtClean="0"/>
+              <a:t>10</a:t>
+            </a:fld>
+            <a:endParaRPr lang="fr-FR"/>
+          </a:p>
+        </p:txBody>
+      </p:sp>
+    </p:spTree>
+    <p:extLst>
+      <p:ext uri="{BB962C8B-B14F-4D97-AF65-F5344CB8AC3E}">
+        <p14:creationId xmlns:p14="http://schemas.microsoft.com/office/powerpoint/2010/main" val="2167198371"/>
       </p:ext>
     </p:extLst>
   </p:cSld>
@@ -8446,7 +10190,7 @@
           <a:p>
             <a:fld id="{67F45AC6-C491-4585-A584-9CE2AF7D5500}" type="datetime1">
               <a:rPr lang="en-US" smtClean="0"/>
-              <a:t>6/3/2025</a:t>
+              <a:t>6/5/2025</a:t>
             </a:fld>
             <a:endParaRPr lang="en-US"/>
           </a:p>
@@ -8883,7 +10627,7 @@
           <a:p>
             <a:fld id="{67F45AC6-C491-4585-A584-9CE2AF7D5500}" type="datetime1">
               <a:rPr lang="en-US" smtClean="0"/>
-              <a:t>6/3/2025</a:t>
+              <a:t>6/5/2025</a:t>
             </a:fld>
             <a:endParaRPr lang="en-US"/>
           </a:p>
@@ -9134,7 +10878,7 @@
           <a:p>
             <a:fld id="{67F45AC6-C491-4585-A584-9CE2AF7D5500}" type="datetime1">
               <a:rPr lang="en-US" smtClean="0"/>
-              <a:t>6/3/2025</a:t>
+              <a:t>6/5/2025</a:t>
             </a:fld>
             <a:endParaRPr lang="en-US"/>
           </a:p>
@@ -9443,7 +11187,7 @@
           <a:p>
             <a:fld id="{67F45AC6-C491-4585-A584-9CE2AF7D5500}" type="datetime1">
               <a:rPr lang="en-US" smtClean="0"/>
-              <a:t>6/3/2025</a:t>
+              <a:t>6/5/2025</a:t>
             </a:fld>
             <a:endParaRPr lang="en-US"/>
           </a:p>
@@ -9762,7 +11506,7 @@
           <a:p>
             <a:fld id="{67F45AC6-C491-4585-A584-9CE2AF7D5500}" type="datetime1">
               <a:rPr lang="en-US" smtClean="0"/>
-              <a:t>6/3/2025</a:t>
+              <a:t>6/5/2025</a:t>
             </a:fld>
             <a:endParaRPr lang="en-US"/>
           </a:p>
@@ -10065,7 +11809,7 @@
           <a:p>
             <a:fld id="{67F45AC6-C491-4585-A584-9CE2AF7D5500}" type="datetime1">
               <a:rPr lang="en-US" smtClean="0"/>
-              <a:t>6/3/2025</a:t>
+              <a:t>6/5/2025</a:t>
             </a:fld>
             <a:endParaRPr lang="en-US"/>
           </a:p>
@@ -10433,7 +12177,7 @@
           <a:p>
             <a:fld id="{67F45AC6-C491-4585-A584-9CE2AF7D5500}" type="datetime1">
               <a:rPr lang="en-US" smtClean="0"/>
-              <a:t>6/3/2025</a:t>
+              <a:t>6/5/2025</a:t>
             </a:fld>
             <a:endParaRPr lang="en-US"/>
           </a:p>
@@ -10608,7 +12352,7 @@
           <a:p>
             <a:fld id="{67F45AC6-C491-4585-A584-9CE2AF7D5500}" type="datetime1">
               <a:rPr lang="en-US" smtClean="0"/>
-              <a:t>6/3/2025</a:t>
+              <a:t>6/5/2025</a:t>
             </a:fld>
             <a:endParaRPr lang="en-US"/>
           </a:p>
@@ -10789,7 +12533,7 @@
           <a:p>
             <a:fld id="{67F45AC6-C491-4585-A584-9CE2AF7D5500}" type="datetime1">
               <a:rPr lang="en-US" smtClean="0"/>
-              <a:t>6/3/2025</a:t>
+              <a:t>6/5/2025</a:t>
             </a:fld>
             <a:endParaRPr lang="en-US"/>
           </a:p>
@@ -10960,7 +12704,7 @@
           <a:p>
             <a:fld id="{67F45AC6-C491-4585-A584-9CE2AF7D5500}" type="datetime1">
               <a:rPr lang="en-US" smtClean="0"/>
-              <a:t>6/3/2025</a:t>
+              <a:t>6/5/2025</a:t>
             </a:fld>
             <a:endParaRPr lang="en-US"/>
           </a:p>
@@ -11211,7 +12955,7 @@
           <a:p>
             <a:fld id="{67F45AC6-C491-4585-A584-9CE2AF7D5500}" type="datetime1">
               <a:rPr lang="en-US" smtClean="0"/>
-              <a:t>6/3/2025</a:t>
+              <a:t>6/5/2025</a:t>
             </a:fld>
             <a:endParaRPr lang="en-US"/>
           </a:p>
@@ -11448,7 +13192,7 @@
           <a:p>
             <a:fld id="{67F45AC6-C491-4585-A584-9CE2AF7D5500}" type="datetime1">
               <a:rPr lang="en-US" smtClean="0"/>
-              <a:t>6/3/2025</a:t>
+              <a:t>6/5/2025</a:t>
             </a:fld>
             <a:endParaRPr lang="en-US"/>
           </a:p>
@@ -11831,7 +13575,7 @@
           <a:p>
             <a:fld id="{67F45AC6-C491-4585-A584-9CE2AF7D5500}" type="datetime1">
               <a:rPr lang="en-US" smtClean="0"/>
-              <a:t>6/3/2025</a:t>
+              <a:t>6/5/2025</a:t>
             </a:fld>
             <a:endParaRPr lang="en-US"/>
           </a:p>
@@ -11950,7 +13694,7 @@
           <a:p>
             <a:fld id="{67F45AC6-C491-4585-A584-9CE2AF7D5500}" type="datetime1">
               <a:rPr lang="en-US" smtClean="0"/>
-              <a:t>6/3/2025</a:t>
+              <a:t>6/5/2025</a:t>
             </a:fld>
             <a:endParaRPr lang="en-US"/>
           </a:p>
@@ -12046,7 +13790,7 @@
           <a:p>
             <a:fld id="{67F45AC6-C491-4585-A584-9CE2AF7D5500}" type="datetime1">
               <a:rPr lang="en-US" smtClean="0"/>
-              <a:t>6/3/2025</a:t>
+              <a:t>6/5/2025</a:t>
             </a:fld>
             <a:endParaRPr lang="en-US"/>
           </a:p>
@@ -12302,7 +14046,7 @@
           <a:p>
             <a:fld id="{67F45AC6-C491-4585-A584-9CE2AF7D5500}" type="datetime1">
               <a:rPr lang="en-US" smtClean="0"/>
-              <a:t>6/3/2025</a:t>
+              <a:t>6/5/2025</a:t>
             </a:fld>
             <a:endParaRPr lang="en-US"/>
           </a:p>
@@ -12586,7 +14330,7 @@
           <a:p>
             <a:fld id="{67F45AC6-C491-4585-A584-9CE2AF7D5500}" type="datetime1">
               <a:rPr lang="en-US" smtClean="0"/>
-              <a:t>6/3/2025</a:t>
+              <a:t>6/5/2025</a:t>
             </a:fld>
             <a:endParaRPr lang="en-US"/>
           </a:p>
@@ -12993,7 +14737,7 @@
           <a:p>
             <a:fld id="{67F45AC6-C491-4585-A584-9CE2AF7D5500}" type="datetime1">
               <a:rPr lang="en-US" smtClean="0"/>
-              <a:t>6/3/2025</a:t>
+              <a:t>6/5/2025</a:t>
             </a:fld>
             <a:endParaRPr lang="en-US"/>
           </a:p>
@@ -13552,7 +15296,7 @@
           <p:nvPr/>
         </p:nvPicPr>
         <p:blipFill>
-          <a:blip r:embed="rId2">
+          <a:blip r:embed="rId3">
             <a:alphaModFix amt="60000"/>
           </a:blip>
           <a:srcRect/>
@@ -13560,7 +15304,7 @@
         </p:blipFill>
         <p:spPr>
           <a:xfrm>
-            <a:off x="1" y="1"/>
+            <a:off x="0" y="-4194"/>
             <a:ext cx="12192000" cy="6857999"/>
           </a:xfrm>
           <a:prstGeom prst="rect">
@@ -13631,7 +15375,7 @@
         </p:spPr>
         <p:txBody>
           <a:bodyPr>
-            <a:normAutofit fontScale="92500" lnSpcReduction="10000"/>
+            <a:normAutofit/>
           </a:bodyPr>
           <a:lstStyle/>
           <a:p>
@@ -13650,16 +15394,6 @@
                 <a:srgbClr val="FFFFFF"/>
               </a:solidFill>
             </a:endParaRPr>
-          </a:p>
-          <a:p>
-            <a:r>
-              <a:rPr lang="fr-FR" sz="2200" dirty="0">
-                <a:solidFill>
-                  <a:srgbClr val="FFFFFF"/>
-                </a:solidFill>
-              </a:rPr>
-              <a:t>Etudiant : Idriss ASKRI </a:t>
-            </a:r>
           </a:p>
         </p:txBody>
       </p:sp>
@@ -13786,70 +15520,6 @@
                       </p:childTnLst>
                     </p:cTn>
                   </p:par>
-                  <p:par>
-                    <p:cTn id="11" fill="hold">
-                      <p:stCondLst>
-                        <p:cond delay="indefinite"/>
-                      </p:stCondLst>
-                      <p:childTnLst>
-                        <p:par>
-                          <p:cTn id="12" fill="hold">
-                            <p:stCondLst>
-                              <p:cond delay="0"/>
-                            </p:stCondLst>
-                            <p:childTnLst>
-                              <p:par>
-                                <p:cTn id="13" presetID="10" presetClass="entr" presetSubtype="0" fill="hold" grpId="0" nodeType="clickEffect">
-                                  <p:stCondLst>
-                                    <p:cond delay="2000"/>
-                                  </p:stCondLst>
-                                  <p:iterate type="lt">
-                                    <p:tmPct val="10000"/>
-                                  </p:iterate>
-                                  <p:childTnLst>
-                                    <p:set>
-                                      <p:cBhvr>
-                                        <p:cTn id="14" dur="1" fill="hold">
-                                          <p:stCondLst>
-                                            <p:cond delay="0"/>
-                                          </p:stCondLst>
-                                        </p:cTn>
-                                        <p:tgtEl>
-                                          <p:spTgt spid="3">
-                                            <p:txEl>
-                                              <p:pRg st="2" end="2"/>
-                                            </p:txEl>
-                                          </p:spTgt>
-                                        </p:tgtEl>
-                                        <p:attrNameLst>
-                                          <p:attrName>style.visibility</p:attrName>
-                                        </p:attrNameLst>
-                                      </p:cBhvr>
-                                      <p:to>
-                                        <p:strVal val="visible"/>
-                                      </p:to>
-                                    </p:set>
-                                    <p:animEffect transition="in" filter="fade">
-                                      <p:cBhvr>
-                                        <p:cTn id="15" dur="400"/>
-                                        <p:tgtEl>
-                                          <p:spTgt spid="3">
-                                            <p:txEl>
-                                              <p:pRg st="2" end="2"/>
-                                            </p:txEl>
-                                          </p:spTgt>
-                                        </p:tgtEl>
-                                      </p:cBhvr>
-                                    </p:animEffect>
-                                  </p:childTnLst>
-                                </p:cTn>
-                              </p:par>
-                            </p:childTnLst>
-                          </p:cTn>
-                        </p:par>
-                      </p:childTnLst>
-                    </p:cTn>
-                  </p:par>
                 </p:childTnLst>
               </p:cTn>
               <p:prevCondLst>
@@ -13924,7 +15594,7 @@
           <a:p>
             <a:r>
               <a:rPr lang="fr-FR" dirty="0"/>
-              <a:t>POURQUOI DES TESTS ? </a:t>
+              <a:t>Cas testes </a:t>
             </a:r>
           </a:p>
         </p:txBody>
@@ -13947,7 +15617,7 @@
         </p:nvSpPr>
         <p:spPr>
           <a:xfrm>
-            <a:off x="720070" y="2272056"/>
+            <a:off x="720070" y="1895538"/>
             <a:ext cx="8534400" cy="3615267"/>
           </a:xfrm>
         </p:spPr>
@@ -13963,7 +15633,7 @@
                   <a:schemeClr val="tx1"/>
                 </a:solidFill>
               </a:rPr>
-              <a:t>Vérifier la logique</a:t>
+              <a:t>7 tests au total </a:t>
             </a:r>
           </a:p>
           <a:p>
@@ -13980,7 +15650,7 @@
                   <a:schemeClr val="tx1"/>
                 </a:solidFill>
               </a:rPr>
-              <a:t>Éviter les bugs</a:t>
+              <a:t>Prix vide, pas nombre, ≤0</a:t>
             </a:r>
           </a:p>
           <a:p>
@@ -13997,7 +15667,7 @@
                   <a:schemeClr val="tx1"/>
                 </a:solidFill>
               </a:rPr>
-              <a:t>Sécuriser l’application</a:t>
+              <a:t>Quantité vide, pas entier, ≤0</a:t>
             </a:r>
           </a:p>
         </p:txBody>
@@ -14005,7 +15675,7 @@
     </p:spTree>
     <p:extLst>
       <p:ext uri="{BB962C8B-B14F-4D97-AF65-F5344CB8AC3E}">
-        <p14:creationId xmlns:p14="http://schemas.microsoft.com/office/powerpoint/2010/main" val="3652177694"/>
+        <p14:creationId xmlns:p14="http://schemas.microsoft.com/office/powerpoint/2010/main" val="1060429990"/>
       </p:ext>
     </p:extLst>
   </p:cSld>
@@ -14060,7 +15730,7 @@
           <a:p>
             <a:r>
               <a:rPr lang="fr-FR" dirty="0"/>
-              <a:t>Cas testes </a:t>
+              <a:t>Exemple d’un test unitaire</a:t>
             </a:r>
           </a:p>
         </p:txBody>
@@ -14099,7 +15769,7 @@
                   <a:schemeClr val="tx1"/>
                 </a:solidFill>
               </a:rPr>
-              <a:t>7 tests au total </a:t>
+              <a:t>Arrange : produit sans nom</a:t>
             </a:r>
           </a:p>
           <a:p>
@@ -14111,12 +15781,20 @@
           </a:p>
           <a:p>
             <a:r>
+              <a:rPr lang="fr-FR" dirty="0" err="1">
+                <a:solidFill>
+                  <a:schemeClr val="tx1"/>
+                </a:solidFill>
+              </a:rPr>
+              <a:t>Act</a:t>
+            </a:r>
+            <a:r>
               <a:rPr lang="fr-FR" dirty="0">
                 <a:solidFill>
                   <a:schemeClr val="tx1"/>
                 </a:solidFill>
               </a:rPr>
-              <a:t>Prix vide, pas nombre, ≤0</a:t>
+              <a:t> : appel méthode</a:t>
             </a:r>
           </a:p>
           <a:p>
@@ -14128,20 +15806,77 @@
           </a:p>
           <a:p>
             <a:r>
+              <a:rPr lang="fr-FR" dirty="0" err="1">
+                <a:solidFill>
+                  <a:schemeClr val="tx1"/>
+                </a:solidFill>
+              </a:rPr>
+              <a:t>Assert</a:t>
+            </a:r>
+            <a:r>
               <a:rPr lang="fr-FR" dirty="0">
                 <a:solidFill>
                   <a:schemeClr val="tx1"/>
                 </a:solidFill>
               </a:rPr>
-              <a:t>Quantité vide, pas entier, ≤0</a:t>
-            </a:r>
+              <a:t> : erreur </a:t>
+            </a:r>
+            <a:r>
+              <a:rPr lang="fr-FR" dirty="0" err="1">
+                <a:solidFill>
+                  <a:schemeClr val="tx1"/>
+                </a:solidFill>
+              </a:rPr>
+              <a:t>MissingName</a:t>
+            </a:r>
+            <a:endParaRPr lang="fr-FR" dirty="0">
+              <a:solidFill>
+                <a:schemeClr val="tx1"/>
+              </a:solidFill>
+            </a:endParaRPr>
           </a:p>
         </p:txBody>
       </p:sp>
+      <p:pic>
+        <p:nvPicPr>
+          <p:cNvPr id="5" name="Image 4" descr="Une image contenant texte, Police, capture d’écran&#10;&#10;Description générée automatiquement">
+            <a:extLst>
+              <a:ext uri="{FF2B5EF4-FFF2-40B4-BE49-F238E27FC236}">
+                <a16:creationId xmlns:a16="http://schemas.microsoft.com/office/drawing/2014/main" id="{A0C9C71D-207C-D991-284D-78D1C9497300}"/>
+              </a:ext>
+            </a:extLst>
+          </p:cNvPr>
+          <p:cNvPicPr>
+            <a:picLocks noChangeAspect="1"/>
+          </p:cNvPicPr>
+          <p:nvPr/>
+        </p:nvPicPr>
+        <p:blipFill>
+          <a:blip r:embed="rId3">
+            <a:extLst>
+              <a:ext uri="{28A0092B-C50C-407E-A947-70E740481C1C}">
+                <a14:useLocalDpi xmlns:a14="http://schemas.microsoft.com/office/drawing/2010/main" val="0"/>
+              </a:ext>
+            </a:extLst>
+          </a:blip>
+          <a:stretch>
+            <a:fillRect/>
+          </a:stretch>
+        </p:blipFill>
+        <p:spPr>
+          <a:xfrm>
+            <a:off x="5569712" y="2335527"/>
+            <a:ext cx="6308157" cy="2735287"/>
+          </a:xfrm>
+          <a:prstGeom prst="rect">
+            <a:avLst/>
+          </a:prstGeom>
+        </p:spPr>
+      </p:pic>
     </p:spTree>
     <p:extLst>
       <p:ext uri="{BB962C8B-B14F-4D97-AF65-F5344CB8AC3E}">
-        <p14:creationId xmlns:p14="http://schemas.microsoft.com/office/powerpoint/2010/main" val="1060429990"/>
+        <p14:creationId xmlns:p14="http://schemas.microsoft.com/office/powerpoint/2010/main" val="2084719791"/>
       </p:ext>
     </p:extLst>
   </p:cSld>
@@ -14195,9 +15930,10 @@
           <a:lstStyle/>
           <a:p>
             <a:r>
-              <a:rPr lang="fr-FR" dirty="0"/>
-              <a:t>Exemple d’un test unitaire</a:t>
-            </a:r>
+              <a:rPr lang="fr-FR"/>
+              <a:t>Résultats des tests</a:t>
+            </a:r>
+            <a:endParaRPr lang="fr-FR" dirty="0"/>
           </a:p>
         </p:txBody>
       </p:sp>
@@ -14235,7 +15971,7 @@
                   <a:schemeClr val="tx1"/>
                 </a:solidFill>
               </a:rPr>
-              <a:t>Arrange : produit sans nom</a:t>
+              <a:t>Tous les tests passent </a:t>
             </a:r>
           </a:p>
           <a:p>
@@ -14247,68 +15983,22 @@
           </a:p>
           <a:p>
             <a:r>
-              <a:rPr lang="fr-FR" dirty="0" err="1">
-                <a:solidFill>
-                  <a:schemeClr val="tx1"/>
-                </a:solidFill>
-              </a:rPr>
-              <a:t>Act</a:t>
-            </a:r>
-            <a:r>
               <a:rPr lang="fr-FR" dirty="0">
                 <a:solidFill>
                   <a:schemeClr val="tx1"/>
                 </a:solidFill>
               </a:rPr>
-              <a:t> : appel méthode</a:t>
-            </a:r>
-          </a:p>
-          <a:p>
-            <a:endParaRPr lang="fr-FR" dirty="0">
-              <a:solidFill>
-                <a:schemeClr val="tx1"/>
-              </a:solidFill>
-            </a:endParaRPr>
-          </a:p>
-          <a:p>
-            <a:r>
-              <a:rPr lang="fr-FR" dirty="0" err="1">
-                <a:solidFill>
-                  <a:schemeClr val="tx1"/>
-                </a:solidFill>
-              </a:rPr>
-              <a:t>Assert</a:t>
-            </a:r>
-            <a:r>
-              <a:rPr lang="fr-FR" dirty="0">
-                <a:solidFill>
-                  <a:schemeClr val="tx1"/>
-                </a:solidFill>
-              </a:rPr>
-              <a:t> : erreur </a:t>
-            </a:r>
-            <a:r>
-              <a:rPr lang="fr-FR" dirty="0" err="1">
-                <a:solidFill>
-                  <a:schemeClr val="tx1"/>
-                </a:solidFill>
-              </a:rPr>
-              <a:t>MissingName</a:t>
-            </a:r>
-            <a:endParaRPr lang="fr-FR" dirty="0">
-              <a:solidFill>
-                <a:schemeClr val="tx1"/>
-              </a:solidFill>
-            </a:endParaRPr>
+              <a:t>100% OK</a:t>
+            </a:r>
           </a:p>
         </p:txBody>
       </p:sp>
       <p:pic>
         <p:nvPicPr>
-          <p:cNvPr id="5" name="Image 4" descr="Une image contenant texte, Police, capture d’écran&#10;&#10;Description générée automatiquement">
+          <p:cNvPr id="7" name="Image 6" descr="Une image contenant texte, capture d’écran, logiciel, affichage&#10;&#10;Description générée automatiquement">
             <a:extLst>
               <a:ext uri="{FF2B5EF4-FFF2-40B4-BE49-F238E27FC236}">
-                <a16:creationId xmlns:a16="http://schemas.microsoft.com/office/drawing/2014/main" id="{A0C9C71D-207C-D991-284D-78D1C9497300}"/>
+                <a16:creationId xmlns:a16="http://schemas.microsoft.com/office/drawing/2014/main" id="{4D63DE81-43D6-3CC2-D544-E81C2B9BC2C4}"/>
               </a:ext>
             </a:extLst>
           </p:cNvPr>
@@ -14318,7 +16008,7 @@
           <p:nvPr/>
         </p:nvPicPr>
         <p:blipFill>
-          <a:blip r:embed="rId2">
+          <a:blip r:embed="rId3">
             <a:extLst>
               <a:ext uri="{28A0092B-C50C-407E-A947-70E740481C1C}">
                 <a14:useLocalDpi xmlns:a14="http://schemas.microsoft.com/office/drawing/2010/main" val="0"/>
@@ -14331,8 +16021,8 @@
         </p:blipFill>
         <p:spPr>
           <a:xfrm>
-            <a:off x="5569712" y="2335527"/>
-            <a:ext cx="6308157" cy="2735287"/>
+            <a:off x="6096000" y="1825810"/>
+            <a:ext cx="5201376" cy="3296110"/>
           </a:xfrm>
           <a:prstGeom prst="rect">
             <a:avLst/>
@@ -14342,7 +16032,7 @@
     </p:spTree>
     <p:extLst>
       <p:ext uri="{BB962C8B-B14F-4D97-AF65-F5344CB8AC3E}">
-        <p14:creationId xmlns:p14="http://schemas.microsoft.com/office/powerpoint/2010/main" val="2084719791"/>
+        <p14:creationId xmlns:p14="http://schemas.microsoft.com/office/powerpoint/2010/main" val="2284578780"/>
       </p:ext>
     </p:extLst>
   </p:cSld>
@@ -14396,10 +16086,9 @@
           <a:lstStyle/>
           <a:p>
             <a:r>
-              <a:rPr lang="fr-FR"/>
-              <a:t>Résultats des tests</a:t>
-            </a:r>
-            <a:endParaRPr lang="fr-FR" dirty="0"/>
+              <a:rPr lang="fr-FR" dirty="0"/>
+              <a:t>Nettoyage du code</a:t>
+            </a:r>
           </a:p>
         </p:txBody>
       </p:sp>
@@ -14437,161 +16126,6 @@
                   <a:schemeClr val="tx1"/>
                 </a:solidFill>
               </a:rPr>
-              <a:t>Tous les tests passent </a:t>
-            </a:r>
-          </a:p>
-          <a:p>
-            <a:endParaRPr lang="fr-FR" dirty="0">
-              <a:solidFill>
-                <a:schemeClr val="tx1"/>
-              </a:solidFill>
-            </a:endParaRPr>
-          </a:p>
-          <a:p>
-            <a:r>
-              <a:rPr lang="fr-FR" dirty="0">
-                <a:solidFill>
-                  <a:schemeClr val="tx1"/>
-                </a:solidFill>
-              </a:rPr>
-              <a:t>100% OK</a:t>
-            </a:r>
-          </a:p>
-        </p:txBody>
-      </p:sp>
-      <p:pic>
-        <p:nvPicPr>
-          <p:cNvPr id="7" name="Image 6" descr="Une image contenant texte, capture d’écran, logiciel, affichage&#10;&#10;Description générée automatiquement">
-            <a:extLst>
-              <a:ext uri="{FF2B5EF4-FFF2-40B4-BE49-F238E27FC236}">
-                <a16:creationId xmlns:a16="http://schemas.microsoft.com/office/drawing/2014/main" id="{4D63DE81-43D6-3CC2-D544-E81C2B9BC2C4}"/>
-              </a:ext>
-            </a:extLst>
-          </p:cNvPr>
-          <p:cNvPicPr>
-            <a:picLocks noChangeAspect="1"/>
-          </p:cNvPicPr>
-          <p:nvPr/>
-        </p:nvPicPr>
-        <p:blipFill>
-          <a:blip r:embed="rId2">
-            <a:extLst>
-              <a:ext uri="{28A0092B-C50C-407E-A947-70E740481C1C}">
-                <a14:useLocalDpi xmlns:a14="http://schemas.microsoft.com/office/drawing/2010/main" val="0"/>
-              </a:ext>
-            </a:extLst>
-          </a:blip>
-          <a:stretch>
-            <a:fillRect/>
-          </a:stretch>
-        </p:blipFill>
-        <p:spPr>
-          <a:xfrm>
-            <a:off x="6096000" y="1825810"/>
-            <a:ext cx="5201376" cy="3296110"/>
-          </a:xfrm>
-          <a:prstGeom prst="rect">
-            <a:avLst/>
-          </a:prstGeom>
-        </p:spPr>
-      </p:pic>
-    </p:spTree>
-    <p:extLst>
-      <p:ext uri="{BB962C8B-B14F-4D97-AF65-F5344CB8AC3E}">
-        <p14:creationId xmlns:p14="http://schemas.microsoft.com/office/powerpoint/2010/main" val="2284578780"/>
-      </p:ext>
-    </p:extLst>
-  </p:cSld>
-  <p:clrMapOvr>
-    <a:masterClrMapping/>
-  </p:clrMapOvr>
-</p:sld>
-</file>
-
-<file path=ppt/slides/slide14.xml><?xml version="1.0" encoding="utf-8"?>
-<p:sld xmlns:a="http://schemas.openxmlformats.org/drawingml/2006/main" xmlns:r="http://schemas.openxmlformats.org/officeDocument/2006/relationships" xmlns:p="http://schemas.openxmlformats.org/presentationml/2006/main">
-  <p:cSld>
-    <p:spTree>
-      <p:nvGrpSpPr>
-        <p:cNvPr id="1" name=""/>
-        <p:cNvGrpSpPr/>
-        <p:nvPr/>
-      </p:nvGrpSpPr>
-      <p:grpSpPr>
-        <a:xfrm>
-          <a:off x="0" y="0"/>
-          <a:ext cx="0" cy="0"/>
-          <a:chOff x="0" y="0"/>
-          <a:chExt cx="0" cy="0"/>
-        </a:xfrm>
-      </p:grpSpPr>
-      <p:sp>
-        <p:nvSpPr>
-          <p:cNvPr id="2" name="Titre 1">
-            <a:extLst>
-              <a:ext uri="{FF2B5EF4-FFF2-40B4-BE49-F238E27FC236}">
-                <a16:creationId xmlns:a16="http://schemas.microsoft.com/office/drawing/2014/main" id="{B84A3AD8-36B1-6E36-FDBF-9A03469BBCAE}"/>
-              </a:ext>
-            </a:extLst>
-          </p:cNvPr>
-          <p:cNvSpPr>
-            <a:spLocks noGrp="1"/>
-          </p:cNvSpPr>
-          <p:nvPr>
-            <p:ph type="title"/>
-          </p:nvPr>
-        </p:nvSpPr>
-        <p:spPr>
-          <a:xfrm>
-            <a:off x="720070" y="318743"/>
-            <a:ext cx="8534400" cy="1507067"/>
-          </a:xfrm>
-        </p:spPr>
-        <p:txBody>
-          <a:bodyPr/>
-          <a:lstStyle/>
-          <a:p>
-            <a:r>
-              <a:rPr lang="fr-FR" dirty="0"/>
-              <a:t>Nettoyage du code</a:t>
-            </a:r>
-          </a:p>
-        </p:txBody>
-      </p:sp>
-      <p:sp>
-        <p:nvSpPr>
-          <p:cNvPr id="3" name="Espace réservé du contenu 2">
-            <a:extLst>
-              <a:ext uri="{FF2B5EF4-FFF2-40B4-BE49-F238E27FC236}">
-                <a16:creationId xmlns:a16="http://schemas.microsoft.com/office/drawing/2014/main" id="{08B38499-C388-A5E4-BADB-5A3632EA4957}"/>
-              </a:ext>
-            </a:extLst>
-          </p:cNvPr>
-          <p:cNvSpPr>
-            <a:spLocks noGrp="1"/>
-          </p:cNvSpPr>
-          <p:nvPr>
-            <p:ph idx="1"/>
-          </p:nvPr>
-        </p:nvSpPr>
-        <p:spPr>
-          <a:xfrm>
-            <a:off x="720070" y="1895538"/>
-            <a:ext cx="8534400" cy="3615267"/>
-          </a:xfrm>
-        </p:spPr>
-        <p:txBody>
-          <a:bodyPr>
-            <a:normAutofit/>
-          </a:bodyPr>
-          <a:lstStyle/>
-          <a:p>
-            <a:r>
-              <a:rPr lang="fr-FR" dirty="0">
-                <a:solidFill>
-                  <a:schemeClr val="tx1"/>
-                </a:solidFill>
-              </a:rPr>
               <a:t>Code clair et lisible</a:t>
             </a:r>
           </a:p>
@@ -14650,7 +16184,7 @@
 </p:sld>
 </file>
 
-<file path=ppt/slides/slide15.xml><?xml version="1.0" encoding="utf-8"?>
+<file path=ppt/slides/slide14.xml><?xml version="1.0" encoding="utf-8"?>
 <p:sld xmlns:a="http://schemas.openxmlformats.org/drawingml/2006/main" xmlns:r="http://schemas.openxmlformats.org/officeDocument/2006/relationships" xmlns:p="http://schemas.openxmlformats.org/presentationml/2006/main">
   <p:cSld>
     <p:spTree>
@@ -14914,7 +16448,7 @@
 </p:sld>
 </file>
 
-<file path=ppt/slides/slide16.xml><?xml version="1.0" encoding="utf-8"?>
+<file path=ppt/slides/slide15.xml><?xml version="1.0" encoding="utf-8"?>
 <p:sld xmlns:a="http://schemas.openxmlformats.org/drawingml/2006/main" xmlns:r="http://schemas.openxmlformats.org/officeDocument/2006/relationships" xmlns:p="http://schemas.openxmlformats.org/presentationml/2006/main">
   <p:cSld>
     <p:spTree>
@@ -14946,7 +16480,7 @@
           <p:nvPr/>
         </p:nvPicPr>
         <p:blipFill>
-          <a:blip r:embed="rId2">
+          <a:blip r:embed="rId3">
             <a:alphaModFix amt="60000"/>
           </a:blip>
           <a:srcRect/>
@@ -15626,7 +17160,7 @@
         </p:xfrm>
         <a:graphic>
           <a:graphicData uri="http://schemas.openxmlformats.org/drawingml/2006/diagram">
-            <dgm:relIds xmlns:dgm="http://schemas.openxmlformats.org/drawingml/2006/diagram" xmlns:r="http://schemas.openxmlformats.org/officeDocument/2006/relationships" r:dm="rId2" r:lo="rId3" r:qs="rId4" r:cs="rId5"/>
+            <dgm:relIds xmlns:dgm="http://schemas.openxmlformats.org/drawingml/2006/diagram" xmlns:r="http://schemas.openxmlformats.org/officeDocument/2006/relationships" r:dm="rId3" r:lo="rId4" r:qs="rId5" r:cs="rId6"/>
           </a:graphicData>
         </a:graphic>
       </p:graphicFrame>
@@ -16227,7 +17761,7 @@
         </p:xfrm>
         <a:graphic>
           <a:graphicData uri="http://schemas.openxmlformats.org/drawingml/2006/diagram">
-            <dgm:relIds xmlns:dgm="http://schemas.openxmlformats.org/drawingml/2006/diagram" xmlns:r="http://schemas.openxmlformats.org/officeDocument/2006/relationships" r:dm="rId2" r:lo="rId3" r:qs="rId4" r:cs="rId5"/>
+            <dgm:relIds xmlns:dgm="http://schemas.openxmlformats.org/drawingml/2006/diagram" xmlns:r="http://schemas.openxmlformats.org/officeDocument/2006/relationships" r:dm="rId3" r:lo="rId4" r:qs="rId5" r:cs="rId6"/>
           </a:graphicData>
         </a:graphic>
       </p:graphicFrame>
@@ -16471,7 +18005,7 @@
           <a:p>
             <a:r>
               <a:rPr lang="fr-FR" dirty="0"/>
-              <a:t>Présentation Du projet </a:t>
+              <a:t>Règles de validation à implémenter</a:t>
             </a:r>
           </a:p>
         </p:txBody>
@@ -16510,158 +18044,6 @@
                   <a:schemeClr val="tx1"/>
                 </a:solidFill>
               </a:rPr>
-              <a:t>Application Web ASP.NET </a:t>
-            </a:r>
-            <a:r>
-              <a:rPr lang="fr-FR" dirty="0" err="1">
-                <a:solidFill>
-                  <a:schemeClr val="tx1"/>
-                </a:solidFill>
-              </a:rPr>
-              <a:t>Core</a:t>
-            </a:r>
-            <a:endParaRPr lang="fr-FR" dirty="0">
-              <a:solidFill>
-                <a:schemeClr val="tx1"/>
-              </a:solidFill>
-            </a:endParaRPr>
-          </a:p>
-          <a:p>
-            <a:endParaRPr lang="fr-FR" dirty="0">
-              <a:solidFill>
-                <a:schemeClr val="tx1"/>
-              </a:solidFill>
-            </a:endParaRPr>
-          </a:p>
-          <a:p>
-            <a:r>
-              <a:rPr lang="fr-FR" dirty="0">
-                <a:solidFill>
-                  <a:schemeClr val="tx1"/>
-                </a:solidFill>
-              </a:rPr>
-              <a:t>Module interne de gestion des stocks</a:t>
-            </a:r>
-          </a:p>
-          <a:p>
-            <a:pPr marL="0" indent="0">
-              <a:buNone/>
-            </a:pPr>
-            <a:endParaRPr lang="fr-FR" dirty="0">
-              <a:solidFill>
-                <a:schemeClr val="tx1"/>
-              </a:solidFill>
-            </a:endParaRPr>
-          </a:p>
-          <a:p>
-            <a:r>
-              <a:rPr lang="fr-FR" dirty="0">
-                <a:solidFill>
-                  <a:schemeClr val="tx1"/>
-                </a:solidFill>
-              </a:rPr>
-              <a:t>Problème : Validation incomplète</a:t>
-            </a:r>
-          </a:p>
-        </p:txBody>
-      </p:sp>
-    </p:spTree>
-    <p:extLst>
-      <p:ext uri="{BB962C8B-B14F-4D97-AF65-F5344CB8AC3E}">
-        <p14:creationId xmlns:p14="http://schemas.microsoft.com/office/powerpoint/2010/main" val="780397209"/>
-      </p:ext>
-    </p:extLst>
-  </p:cSld>
-  <p:clrMapOvr>
-    <a:masterClrMapping/>
-  </p:clrMapOvr>
-</p:sld>
-</file>
-
-<file path=ppt/slides/slide8.xml><?xml version="1.0" encoding="utf-8"?>
-<p:sld xmlns:a="http://schemas.openxmlformats.org/drawingml/2006/main" xmlns:r="http://schemas.openxmlformats.org/officeDocument/2006/relationships" xmlns:p="http://schemas.openxmlformats.org/presentationml/2006/main">
-  <p:cSld>
-    <p:spTree>
-      <p:nvGrpSpPr>
-        <p:cNvPr id="1" name=""/>
-        <p:cNvGrpSpPr/>
-        <p:nvPr/>
-      </p:nvGrpSpPr>
-      <p:grpSpPr>
-        <a:xfrm>
-          <a:off x="0" y="0"/>
-          <a:ext cx="0" cy="0"/>
-          <a:chOff x="0" y="0"/>
-          <a:chExt cx="0" cy="0"/>
-        </a:xfrm>
-      </p:grpSpPr>
-      <p:sp>
-        <p:nvSpPr>
-          <p:cNvPr id="2" name="Titre 1">
-            <a:extLst>
-              <a:ext uri="{FF2B5EF4-FFF2-40B4-BE49-F238E27FC236}">
-                <a16:creationId xmlns:a16="http://schemas.microsoft.com/office/drawing/2014/main" id="{B84A3AD8-36B1-6E36-FDBF-9A03469BBCAE}"/>
-              </a:ext>
-            </a:extLst>
-          </p:cNvPr>
-          <p:cNvSpPr>
-            <a:spLocks noGrp="1"/>
-          </p:cNvSpPr>
-          <p:nvPr>
-            <p:ph type="title"/>
-          </p:nvPr>
-        </p:nvSpPr>
-        <p:spPr>
-          <a:xfrm>
-            <a:off x="720070" y="318743"/>
-            <a:ext cx="8534400" cy="1507067"/>
-          </a:xfrm>
-        </p:spPr>
-        <p:txBody>
-          <a:bodyPr/>
-          <a:lstStyle/>
-          <a:p>
-            <a:r>
-              <a:rPr lang="fr-FR" dirty="0"/>
-              <a:t>Règles de validation à implémenter</a:t>
-            </a:r>
-          </a:p>
-        </p:txBody>
-      </p:sp>
-      <p:sp>
-        <p:nvSpPr>
-          <p:cNvPr id="3" name="Espace réservé du contenu 2">
-            <a:extLst>
-              <a:ext uri="{FF2B5EF4-FFF2-40B4-BE49-F238E27FC236}">
-                <a16:creationId xmlns:a16="http://schemas.microsoft.com/office/drawing/2014/main" id="{08B38499-C388-A5E4-BADB-5A3632EA4957}"/>
-              </a:ext>
-            </a:extLst>
-          </p:cNvPr>
-          <p:cNvSpPr>
-            <a:spLocks noGrp="1"/>
-          </p:cNvSpPr>
-          <p:nvPr>
-            <p:ph idx="1"/>
-          </p:nvPr>
-        </p:nvSpPr>
-        <p:spPr>
-          <a:xfrm>
-            <a:off x="720070" y="2272056"/>
-            <a:ext cx="8534400" cy="3615267"/>
-          </a:xfrm>
-        </p:spPr>
-        <p:txBody>
-          <a:bodyPr>
-            <a:normAutofit/>
-          </a:bodyPr>
-          <a:lstStyle/>
-          <a:p>
-            <a:r>
-              <a:rPr lang="fr-FR" dirty="0">
-                <a:solidFill>
-                  <a:schemeClr val="tx1"/>
-                </a:solidFill>
-              </a:rPr>
               <a:t>Nom obligatoire</a:t>
             </a:r>
           </a:p>
@@ -16714,7 +18096,7 @@
 </p:sld>
 </file>
 
-<file path=ppt/slides/slide9.xml><?xml version="1.0" encoding="utf-8"?>
+<file path=ppt/slides/slide8.xml><?xml version="1.0" encoding="utf-8"?>
 <p:sld xmlns:a="http://schemas.openxmlformats.org/drawingml/2006/main" xmlns:r="http://schemas.openxmlformats.org/officeDocument/2006/relationships" xmlns:p="http://schemas.openxmlformats.org/presentationml/2006/main">
   <p:cSld>
     <p:bg>
@@ -16853,7 +18235,7 @@
           <p:nvPr/>
         </p:nvPicPr>
         <p:blipFill>
-          <a:blip r:embed="rId2">
+          <a:blip r:embed="rId3">
             <a:extLst>
               <a:ext uri="{28A0092B-C50C-407E-A947-70E740481C1C}">
                 <a14:useLocalDpi xmlns:a14="http://schemas.microsoft.com/office/drawing/2010/main" val="0"/>
@@ -17290,6 +18672,142 @@
   </p:cSld>
   <p:clrMapOvr>
     <a:overrideClrMapping bg1="lt1" tx1="dk1" bg2="lt2" tx2="dk2" accent1="accent1" accent2="accent2" accent3="accent3" accent4="accent4" accent5="accent5" accent6="accent6" hlink="hlink" folHlink="folHlink"/>
+  </p:clrMapOvr>
+</p:sld>
+</file>
+
+<file path=ppt/slides/slide9.xml><?xml version="1.0" encoding="utf-8"?>
+<p:sld xmlns:a="http://schemas.openxmlformats.org/drawingml/2006/main" xmlns:r="http://schemas.openxmlformats.org/officeDocument/2006/relationships" xmlns:p="http://schemas.openxmlformats.org/presentationml/2006/main">
+  <p:cSld>
+    <p:spTree>
+      <p:nvGrpSpPr>
+        <p:cNvPr id="1" name=""/>
+        <p:cNvGrpSpPr/>
+        <p:nvPr/>
+      </p:nvGrpSpPr>
+      <p:grpSpPr>
+        <a:xfrm>
+          <a:off x="0" y="0"/>
+          <a:ext cx="0" cy="0"/>
+          <a:chOff x="0" y="0"/>
+          <a:chExt cx="0" cy="0"/>
+        </a:xfrm>
+      </p:grpSpPr>
+      <p:sp>
+        <p:nvSpPr>
+          <p:cNvPr id="2" name="Titre 1">
+            <a:extLst>
+              <a:ext uri="{FF2B5EF4-FFF2-40B4-BE49-F238E27FC236}">
+                <a16:creationId xmlns:a16="http://schemas.microsoft.com/office/drawing/2014/main" id="{B84A3AD8-36B1-6E36-FDBF-9A03469BBCAE}"/>
+              </a:ext>
+            </a:extLst>
+          </p:cNvPr>
+          <p:cNvSpPr>
+            <a:spLocks noGrp="1"/>
+          </p:cNvSpPr>
+          <p:nvPr>
+            <p:ph type="title"/>
+          </p:nvPr>
+        </p:nvSpPr>
+        <p:spPr>
+          <a:xfrm>
+            <a:off x="720070" y="318743"/>
+            <a:ext cx="8534400" cy="1507067"/>
+          </a:xfrm>
+        </p:spPr>
+        <p:txBody>
+          <a:bodyPr/>
+          <a:lstStyle/>
+          <a:p>
+            <a:r>
+              <a:rPr lang="fr-FR" dirty="0"/>
+              <a:t>POURQUOI DES TESTS ? </a:t>
+            </a:r>
+          </a:p>
+        </p:txBody>
+      </p:sp>
+      <p:sp>
+        <p:nvSpPr>
+          <p:cNvPr id="3" name="Espace réservé du contenu 2">
+            <a:extLst>
+              <a:ext uri="{FF2B5EF4-FFF2-40B4-BE49-F238E27FC236}">
+                <a16:creationId xmlns:a16="http://schemas.microsoft.com/office/drawing/2014/main" id="{08B38499-C388-A5E4-BADB-5A3632EA4957}"/>
+              </a:ext>
+            </a:extLst>
+          </p:cNvPr>
+          <p:cNvSpPr>
+            <a:spLocks noGrp="1"/>
+          </p:cNvSpPr>
+          <p:nvPr>
+            <p:ph idx="1"/>
+          </p:nvPr>
+        </p:nvSpPr>
+        <p:spPr>
+          <a:xfrm>
+            <a:off x="720070" y="2272056"/>
+            <a:ext cx="8534400" cy="3615267"/>
+          </a:xfrm>
+        </p:spPr>
+        <p:txBody>
+          <a:bodyPr>
+            <a:normAutofit/>
+          </a:bodyPr>
+          <a:lstStyle/>
+          <a:p>
+            <a:r>
+              <a:rPr lang="fr-FR" dirty="0">
+                <a:solidFill>
+                  <a:schemeClr val="tx1"/>
+                </a:solidFill>
+              </a:rPr>
+              <a:t>Vérifier la logique</a:t>
+            </a:r>
+          </a:p>
+          <a:p>
+            <a:endParaRPr lang="fr-FR" dirty="0">
+              <a:solidFill>
+                <a:schemeClr val="tx1"/>
+              </a:solidFill>
+            </a:endParaRPr>
+          </a:p>
+          <a:p>
+            <a:r>
+              <a:rPr lang="fr-FR" dirty="0">
+                <a:solidFill>
+                  <a:schemeClr val="tx1"/>
+                </a:solidFill>
+              </a:rPr>
+              <a:t>Éviter les bugs</a:t>
+            </a:r>
+          </a:p>
+          <a:p>
+            <a:endParaRPr lang="fr-FR" dirty="0">
+              <a:solidFill>
+                <a:schemeClr val="tx1"/>
+              </a:solidFill>
+            </a:endParaRPr>
+          </a:p>
+          <a:p>
+            <a:r>
+              <a:rPr lang="fr-FR" dirty="0">
+                <a:solidFill>
+                  <a:schemeClr val="tx1"/>
+                </a:solidFill>
+              </a:rPr>
+              <a:t>Sécuriser l’application</a:t>
+            </a:r>
+          </a:p>
+        </p:txBody>
+      </p:sp>
+    </p:spTree>
+    <p:extLst>
+      <p:ext uri="{BB962C8B-B14F-4D97-AF65-F5344CB8AC3E}">
+        <p14:creationId xmlns:p14="http://schemas.microsoft.com/office/powerpoint/2010/main" val="3652177694"/>
+      </p:ext>
+    </p:extLst>
+  </p:cSld>
+  <p:clrMapOvr>
+    <a:masterClrMapping/>
   </p:clrMapOvr>
 </p:sld>
 </file>

</xml_diff>